<commit_message>
ng2 module 1 complete
</commit_message>
<xml_diff>
--- a/angular2/slides/01_Introduction.pptx
+++ b/angular2/slides/01_Introduction.pptx
@@ -5,10 +5,10 @@
     <p:sldMasterId id="2147483772" r:id="rId1"/>
   </p:sldMasterIdLst>
   <p:notesMasterIdLst>
-    <p:notesMasterId r:id="rId11"/>
+    <p:notesMasterId r:id="rId24"/>
   </p:notesMasterIdLst>
   <p:handoutMasterIdLst>
-    <p:handoutMasterId r:id="rId12"/>
+    <p:handoutMasterId r:id="rId25"/>
   </p:handoutMasterIdLst>
   <p:sldIdLst>
     <p:sldId id="327" r:id="rId2"/>
@@ -20,6 +20,19 @@
     <p:sldId id="333" r:id="rId8"/>
     <p:sldId id="334" r:id="rId9"/>
     <p:sldId id="335" r:id="rId10"/>
+    <p:sldId id="336" r:id="rId11"/>
+    <p:sldId id="337" r:id="rId12"/>
+    <p:sldId id="338" r:id="rId13"/>
+    <p:sldId id="339" r:id="rId14"/>
+    <p:sldId id="340" r:id="rId15"/>
+    <p:sldId id="341" r:id="rId16"/>
+    <p:sldId id="342" r:id="rId17"/>
+    <p:sldId id="343" r:id="rId18"/>
+    <p:sldId id="344" r:id="rId19"/>
+    <p:sldId id="345" r:id="rId20"/>
+    <p:sldId id="346" r:id="rId21"/>
+    <p:sldId id="347" r:id="rId22"/>
+    <p:sldId id="349" r:id="rId23"/>
   </p:sldIdLst>
   <p:sldSz cx="9144000" cy="6858000" type="screen4x3"/>
   <p:notesSz cx="7302500" cy="9588500"/>
@@ -272,7 +285,7 @@
               <a:pPr>
                 <a:defRPr/>
               </a:pPr>
-              <a:t>12/14/2015</a:t>
+              <a:t>12/15/2015</a:t>
             </a:fld>
             <a:endParaRPr lang="en-US"/>
           </a:p>
@@ -2465,6 +2478,2284 @@
 </p:sld>
 </file>
 
+<file path=ppt/slides/slide10.xml><?xml version="1.0" encoding="utf-8"?>
+<p:sld xmlns:a="http://schemas.openxmlformats.org/drawingml/2006/main" xmlns:r="http://schemas.openxmlformats.org/officeDocument/2006/relationships" xmlns:p="http://schemas.openxmlformats.org/presentationml/2006/main">
+  <p:cSld>
+    <p:spTree>
+      <p:nvGrpSpPr>
+        <p:cNvPr id="1" name=""/>
+        <p:cNvGrpSpPr/>
+        <p:nvPr/>
+      </p:nvGrpSpPr>
+      <p:grpSpPr>
+        <a:xfrm>
+          <a:off x="0" y="0"/>
+          <a:ext cx="0" cy="0"/>
+          <a:chOff x="0" y="0"/>
+          <a:chExt cx="0" cy="0"/>
+        </a:xfrm>
+      </p:grpSpPr>
+      <p:sp>
+        <p:nvSpPr>
+          <p:cNvPr id="2" name="Title 1"/>
+          <p:cNvSpPr>
+            <a:spLocks noGrp="1"/>
+          </p:cNvSpPr>
+          <p:nvPr>
+            <p:ph type="title"/>
+          </p:nvPr>
+        </p:nvSpPr>
+        <p:spPr/>
+        <p:txBody>
+          <a:bodyPr/>
+          <a:lstStyle/>
+          <a:p>
+            <a:r>
+              <a:rPr lang="en-US" dirty="0" smtClean="0"/>
+              <a:t>Components</a:t>
+            </a:r>
+            <a:endParaRPr lang="en-US" dirty="0"/>
+          </a:p>
+        </p:txBody>
+      </p:sp>
+      <p:sp>
+        <p:nvSpPr>
+          <p:cNvPr id="3" name="Text Placeholder 2"/>
+          <p:cNvSpPr>
+            <a:spLocks noGrp="1"/>
+          </p:cNvSpPr>
+          <p:nvPr>
+            <p:ph type="body" idx="1"/>
+          </p:nvPr>
+        </p:nvSpPr>
+        <p:spPr/>
+        <p:txBody>
+          <a:bodyPr/>
+          <a:lstStyle/>
+          <a:p>
+            <a:r>
+              <a:rPr lang="en-US" dirty="0" smtClean="0"/>
+              <a:t>Components include a template</a:t>
+            </a:r>
+          </a:p>
+          <a:p>
+            <a:pPr lvl="1"/>
+            <a:r>
+              <a:rPr lang="en-US" dirty="0" smtClean="0"/>
+              <a:t>Like directives, can customize HTML</a:t>
+            </a:r>
+            <a:endParaRPr lang="en-US" dirty="0"/>
+          </a:p>
+        </p:txBody>
+      </p:sp>
+      <p:pic>
+        <p:nvPicPr>
+          <p:cNvPr id="4" name="Picture 3"/>
+          <p:cNvPicPr>
+            <a:picLocks noChangeAspect="1"/>
+          </p:cNvPicPr>
+          <p:nvPr/>
+        </p:nvPicPr>
+        <p:blipFill>
+          <a:blip r:embed="rId2"/>
+          <a:stretch>
+            <a:fillRect/>
+          </a:stretch>
+        </p:blipFill>
+        <p:spPr>
+          <a:xfrm>
+            <a:off x="1600200" y="2286000"/>
+            <a:ext cx="5286375" cy="4324350"/>
+          </a:xfrm>
+          <a:prstGeom prst="rect">
+            <a:avLst/>
+          </a:prstGeom>
+        </p:spPr>
+      </p:pic>
+    </p:spTree>
+    <p:extLst>
+      <p:ext uri="{BB962C8B-B14F-4D97-AF65-F5344CB8AC3E}">
+        <p14:creationId xmlns:p14="http://schemas.microsoft.com/office/powerpoint/2010/main" val="308947159"/>
+      </p:ext>
+    </p:extLst>
+  </p:cSld>
+  <p:clrMapOvr>
+    <a:masterClrMapping/>
+  </p:clrMapOvr>
+  <p:transition>
+    <p:fade/>
+  </p:transition>
+  <p:timing>
+    <p:tnLst>
+      <p:par>
+        <p:cTn id="1" dur="indefinite" restart="never" nodeType="tmRoot"/>
+      </p:par>
+    </p:tnLst>
+  </p:timing>
+</p:sld>
+</file>
+
+<file path=ppt/slides/slide11.xml><?xml version="1.0" encoding="utf-8"?>
+<p:sld xmlns:a="http://schemas.openxmlformats.org/drawingml/2006/main" xmlns:r="http://schemas.openxmlformats.org/officeDocument/2006/relationships" xmlns:p="http://schemas.openxmlformats.org/presentationml/2006/main">
+  <p:cSld>
+    <p:spTree>
+      <p:nvGrpSpPr>
+        <p:cNvPr id="1" name=""/>
+        <p:cNvGrpSpPr/>
+        <p:nvPr/>
+      </p:nvGrpSpPr>
+      <p:grpSpPr>
+        <a:xfrm>
+          <a:off x="0" y="0"/>
+          <a:ext cx="0" cy="0"/>
+          <a:chOff x="0" y="0"/>
+          <a:chExt cx="0" cy="0"/>
+        </a:xfrm>
+      </p:grpSpPr>
+      <p:sp>
+        <p:nvSpPr>
+          <p:cNvPr id="2" name="Title 1"/>
+          <p:cNvSpPr>
+            <a:spLocks noGrp="1"/>
+          </p:cNvSpPr>
+          <p:nvPr>
+            <p:ph type="title"/>
+          </p:nvPr>
+        </p:nvSpPr>
+        <p:spPr/>
+        <p:txBody>
+          <a:bodyPr/>
+          <a:lstStyle/>
+          <a:p>
+            <a:r>
+              <a:rPr lang="en-US" dirty="0" smtClean="0"/>
+              <a:t>Templates</a:t>
+            </a:r>
+            <a:endParaRPr lang="en-US" dirty="0"/>
+          </a:p>
+        </p:txBody>
+      </p:sp>
+      <p:sp>
+        <p:nvSpPr>
+          <p:cNvPr id="3" name="Text Placeholder 2"/>
+          <p:cNvSpPr>
+            <a:spLocks noGrp="1"/>
+          </p:cNvSpPr>
+          <p:nvPr>
+            <p:ph type="body" idx="1"/>
+          </p:nvPr>
+        </p:nvSpPr>
+        <p:spPr/>
+        <p:txBody>
+          <a:bodyPr/>
+          <a:lstStyle/>
+          <a:p>
+            <a:r>
+              <a:rPr lang="en-US" dirty="0" smtClean="0"/>
+              <a:t>Responsible for presenting the model</a:t>
+            </a:r>
+          </a:p>
+          <a:p>
+            <a:pPr lvl="1"/>
+            <a:r>
+              <a:rPr lang="en-US" dirty="0" smtClean="0"/>
+              <a:t>Using directives and {{ interpolation }}</a:t>
+            </a:r>
+            <a:endParaRPr lang="en-US" dirty="0"/>
+          </a:p>
+        </p:txBody>
+      </p:sp>
+      <p:pic>
+        <p:nvPicPr>
+          <p:cNvPr id="4" name="Picture 3"/>
+          <p:cNvPicPr>
+            <a:picLocks noChangeAspect="1"/>
+          </p:cNvPicPr>
+          <p:nvPr/>
+        </p:nvPicPr>
+        <p:blipFill>
+          <a:blip r:embed="rId2"/>
+          <a:stretch>
+            <a:fillRect/>
+          </a:stretch>
+        </p:blipFill>
+        <p:spPr>
+          <a:xfrm>
+            <a:off x="1600200" y="2667000"/>
+            <a:ext cx="5716518" cy="2667000"/>
+          </a:xfrm>
+          <a:prstGeom prst="rect">
+            <a:avLst/>
+          </a:prstGeom>
+        </p:spPr>
+      </p:pic>
+    </p:spTree>
+    <p:extLst>
+      <p:ext uri="{BB962C8B-B14F-4D97-AF65-F5344CB8AC3E}">
+        <p14:creationId xmlns:p14="http://schemas.microsoft.com/office/powerpoint/2010/main" val="258812506"/>
+      </p:ext>
+    </p:extLst>
+  </p:cSld>
+  <p:clrMapOvr>
+    <a:masterClrMapping/>
+  </p:clrMapOvr>
+  <p:transition>
+    <p:fade/>
+  </p:transition>
+  <p:timing>
+    <p:tnLst>
+      <p:par>
+        <p:cTn id="1" dur="indefinite" restart="never" nodeType="tmRoot"/>
+      </p:par>
+    </p:tnLst>
+  </p:timing>
+</p:sld>
+</file>
+
+<file path=ppt/slides/slide12.xml><?xml version="1.0" encoding="utf-8"?>
+<p:sld xmlns:a="http://schemas.openxmlformats.org/drawingml/2006/main" xmlns:r="http://schemas.openxmlformats.org/officeDocument/2006/relationships" xmlns:p="http://schemas.openxmlformats.org/presentationml/2006/main">
+  <p:cSld>
+    <p:spTree>
+      <p:nvGrpSpPr>
+        <p:cNvPr id="1" name=""/>
+        <p:cNvGrpSpPr/>
+        <p:nvPr/>
+      </p:nvGrpSpPr>
+      <p:grpSpPr>
+        <a:xfrm>
+          <a:off x="0" y="0"/>
+          <a:ext cx="0" cy="0"/>
+          <a:chOff x="0" y="0"/>
+          <a:chExt cx="0" cy="0"/>
+        </a:xfrm>
+      </p:grpSpPr>
+      <p:sp>
+        <p:nvSpPr>
+          <p:cNvPr id="2" name="Title 1"/>
+          <p:cNvSpPr>
+            <a:spLocks noGrp="1"/>
+          </p:cNvSpPr>
+          <p:nvPr>
+            <p:ph type="title"/>
+          </p:nvPr>
+        </p:nvSpPr>
+        <p:spPr/>
+        <p:txBody>
+          <a:bodyPr/>
+          <a:lstStyle/>
+          <a:p>
+            <a:r>
+              <a:rPr lang="en-US" dirty="0" smtClean="0"/>
+              <a:t>Models</a:t>
+            </a:r>
+            <a:endParaRPr lang="en-US" dirty="0"/>
+          </a:p>
+        </p:txBody>
+      </p:sp>
+      <p:sp>
+        <p:nvSpPr>
+          <p:cNvPr id="3" name="Text Placeholder 2"/>
+          <p:cNvSpPr>
+            <a:spLocks noGrp="1"/>
+          </p:cNvSpPr>
+          <p:nvPr>
+            <p:ph type="body" idx="1"/>
+          </p:nvPr>
+        </p:nvSpPr>
+        <p:spPr/>
+        <p:txBody>
+          <a:bodyPr/>
+          <a:lstStyle/>
+          <a:p>
+            <a:r>
+              <a:rPr lang="en-US" dirty="0" smtClean="0"/>
+              <a:t>Plain Old JavaScript (2015)</a:t>
+            </a:r>
+          </a:p>
+          <a:p>
+            <a:r>
+              <a:rPr lang="en-US" dirty="0" smtClean="0"/>
+              <a:t>Component fields exposed for binding</a:t>
+            </a:r>
+            <a:endParaRPr lang="en-US" dirty="0"/>
+          </a:p>
+        </p:txBody>
+      </p:sp>
+      <p:pic>
+        <p:nvPicPr>
+          <p:cNvPr id="4" name="Picture 3"/>
+          <p:cNvPicPr>
+            <a:picLocks noChangeAspect="1"/>
+          </p:cNvPicPr>
+          <p:nvPr/>
+        </p:nvPicPr>
+        <p:blipFill>
+          <a:blip r:embed="rId2"/>
+          <a:stretch>
+            <a:fillRect/>
+          </a:stretch>
+        </p:blipFill>
+        <p:spPr>
+          <a:xfrm>
+            <a:off x="1676400" y="2209800"/>
+            <a:ext cx="5295900" cy="4476750"/>
+          </a:xfrm>
+          <a:prstGeom prst="rect">
+            <a:avLst/>
+          </a:prstGeom>
+        </p:spPr>
+      </p:pic>
+    </p:spTree>
+    <p:extLst>
+      <p:ext uri="{BB962C8B-B14F-4D97-AF65-F5344CB8AC3E}">
+        <p14:creationId xmlns:p14="http://schemas.microsoft.com/office/powerpoint/2010/main" val="1104661462"/>
+      </p:ext>
+    </p:extLst>
+  </p:cSld>
+  <p:clrMapOvr>
+    <a:masterClrMapping/>
+  </p:clrMapOvr>
+  <p:transition>
+    <p:fade/>
+  </p:transition>
+  <p:timing>
+    <p:tnLst>
+      <p:par>
+        <p:cTn id="1" dur="indefinite" restart="never" nodeType="tmRoot">
+          <p:childTnLst>
+            <p:seq concurrent="1" nextAc="seek">
+              <p:cTn id="2" dur="indefinite" nodeType="mainSeq">
+                <p:childTnLst>
+                  <p:par>
+                    <p:cTn id="3" fill="hold">
+                      <p:stCondLst>
+                        <p:cond delay="indefinite"/>
+                      </p:stCondLst>
+                      <p:childTnLst>
+                        <p:par>
+                          <p:cTn id="4" fill="hold">
+                            <p:stCondLst>
+                              <p:cond delay="0"/>
+                            </p:stCondLst>
+                            <p:childTnLst>
+                              <p:par>
+                                <p:cTn id="5" presetID="10" presetClass="entr" presetSubtype="0" fill="hold" nodeType="clickEffect">
+                                  <p:stCondLst>
+                                    <p:cond delay="0"/>
+                                  </p:stCondLst>
+                                  <p:childTnLst>
+                                    <p:set>
+                                      <p:cBhvr>
+                                        <p:cTn id="6" dur="1" fill="hold">
+                                          <p:stCondLst>
+                                            <p:cond delay="0"/>
+                                          </p:stCondLst>
+                                        </p:cTn>
+                                        <p:tgtEl>
+                                          <p:spTgt spid="4"/>
+                                        </p:tgtEl>
+                                        <p:attrNameLst>
+                                          <p:attrName>style.visibility</p:attrName>
+                                        </p:attrNameLst>
+                                      </p:cBhvr>
+                                      <p:to>
+                                        <p:strVal val="visible"/>
+                                      </p:to>
+                                    </p:set>
+                                    <p:animEffect transition="in" filter="fade">
+                                      <p:cBhvr>
+                                        <p:cTn id="7" dur="500"/>
+                                        <p:tgtEl>
+                                          <p:spTgt spid="4"/>
+                                        </p:tgtEl>
+                                      </p:cBhvr>
+                                    </p:animEffect>
+                                  </p:childTnLst>
+                                </p:cTn>
+                              </p:par>
+                            </p:childTnLst>
+                          </p:cTn>
+                        </p:par>
+                      </p:childTnLst>
+                    </p:cTn>
+                  </p:par>
+                </p:childTnLst>
+              </p:cTn>
+              <p:prevCondLst>
+                <p:cond evt="onPrev" delay="0">
+                  <p:tgtEl>
+                    <p:sldTgt/>
+                  </p:tgtEl>
+                </p:cond>
+              </p:prevCondLst>
+              <p:nextCondLst>
+                <p:cond evt="onNext" delay="0">
+                  <p:tgtEl>
+                    <p:sldTgt/>
+                  </p:tgtEl>
+                </p:cond>
+              </p:nextCondLst>
+            </p:seq>
+          </p:childTnLst>
+        </p:cTn>
+      </p:par>
+    </p:tnLst>
+  </p:timing>
+</p:sld>
+</file>
+
+<file path=ppt/slides/slide13.xml><?xml version="1.0" encoding="utf-8"?>
+<p:sld xmlns:a="http://schemas.openxmlformats.org/drawingml/2006/main" xmlns:r="http://schemas.openxmlformats.org/officeDocument/2006/relationships" xmlns:p="http://schemas.openxmlformats.org/presentationml/2006/main">
+  <p:cSld>
+    <p:spTree>
+      <p:nvGrpSpPr>
+        <p:cNvPr id="1" name=""/>
+        <p:cNvGrpSpPr/>
+        <p:nvPr/>
+      </p:nvGrpSpPr>
+      <p:grpSpPr>
+        <a:xfrm>
+          <a:off x="0" y="0"/>
+          <a:ext cx="0" cy="0"/>
+          <a:chOff x="0" y="0"/>
+          <a:chExt cx="0" cy="0"/>
+        </a:xfrm>
+      </p:grpSpPr>
+      <p:sp>
+        <p:nvSpPr>
+          <p:cNvPr id="2" name="Title 1"/>
+          <p:cNvSpPr>
+            <a:spLocks noGrp="1"/>
+          </p:cNvSpPr>
+          <p:nvPr>
+            <p:ph type="title"/>
+          </p:nvPr>
+        </p:nvSpPr>
+        <p:spPr/>
+        <p:txBody>
+          <a:bodyPr/>
+          <a:lstStyle/>
+          <a:p>
+            <a:r>
+              <a:rPr lang="en-US" dirty="0" smtClean="0"/>
+              <a:t>Essence</a:t>
+            </a:r>
+            <a:endParaRPr lang="en-US" dirty="0"/>
+          </a:p>
+        </p:txBody>
+      </p:sp>
+      <p:sp>
+        <p:nvSpPr>
+          <p:cNvPr id="3" name="Text Placeholder 2"/>
+          <p:cNvSpPr>
+            <a:spLocks noGrp="1"/>
+          </p:cNvSpPr>
+          <p:nvPr>
+            <p:ph type="body" idx="1"/>
+          </p:nvPr>
+        </p:nvSpPr>
+        <p:spPr/>
+        <p:txBody>
+          <a:bodyPr/>
+          <a:lstStyle/>
+          <a:p>
+            <a:r>
+              <a:rPr lang="en-US" dirty="0" smtClean="0"/>
+              <a:t>Components</a:t>
+            </a:r>
+          </a:p>
+          <a:p>
+            <a:pPr lvl="1"/>
+            <a:r>
+              <a:rPr lang="en-US" dirty="0" smtClean="0"/>
+              <a:t>No direct DOM manipulation</a:t>
+            </a:r>
+          </a:p>
+          <a:p>
+            <a:r>
+              <a:rPr lang="en-US" dirty="0" smtClean="0"/>
+              <a:t>Templates</a:t>
+            </a:r>
+          </a:p>
+          <a:p>
+            <a:pPr lvl="1"/>
+            <a:r>
+              <a:rPr lang="en-US" dirty="0" smtClean="0"/>
+              <a:t>No serious model manipulation</a:t>
+            </a:r>
+            <a:endParaRPr lang="en-US" dirty="0"/>
+          </a:p>
+        </p:txBody>
+      </p:sp>
+      <p:sp>
+        <p:nvSpPr>
+          <p:cNvPr id="4" name="Rectangle 3"/>
+          <p:cNvSpPr/>
+          <p:nvPr/>
+        </p:nvSpPr>
+        <p:spPr bwMode="auto">
+          <a:xfrm>
+            <a:off x="5535930" y="1371600"/>
+            <a:ext cx="2819400" cy="990600"/>
+          </a:xfrm>
+          <a:prstGeom prst="rect">
+            <a:avLst/>
+          </a:prstGeom>
+          <a:ln>
+            <a:headEnd/>
+            <a:tailEnd/>
+          </a:ln>
+        </p:spPr>
+        <p:style>
+          <a:lnRef idx="2">
+            <a:schemeClr val="accent2">
+              <a:shade val="50000"/>
+            </a:schemeClr>
+          </a:lnRef>
+          <a:fillRef idx="1">
+            <a:schemeClr val="accent2"/>
+          </a:fillRef>
+          <a:effectRef idx="0">
+            <a:schemeClr val="accent2"/>
+          </a:effectRef>
+          <a:fontRef idx="minor">
+            <a:schemeClr val="lt1"/>
+          </a:fontRef>
+        </p:style>
+        <p:txBody>
+          <a:bodyPr wrap="none" rtlCol="0" anchor="ctr"/>
+          <a:lstStyle/>
+          <a:p>
+            <a:pPr algn="ctr"/>
+            <a:r>
+              <a:rPr lang="en-US" sz="2000" dirty="0" smtClean="0">
+                <a:solidFill>
+                  <a:schemeClr val="tx1"/>
+                </a:solidFill>
+                <a:latin typeface="Tekton Pro" pitchFamily="34" charset="0"/>
+              </a:rPr>
+              <a:t>&lt;template&gt;</a:t>
+            </a:r>
+            <a:endParaRPr lang="en-US" sz="2000" dirty="0">
+              <a:solidFill>
+                <a:schemeClr val="tx1"/>
+              </a:solidFill>
+              <a:latin typeface="Tekton Pro" pitchFamily="34" charset="0"/>
+            </a:endParaRPr>
+          </a:p>
+        </p:txBody>
+      </p:sp>
+      <p:sp>
+        <p:nvSpPr>
+          <p:cNvPr id="5" name="Rectangle 4"/>
+          <p:cNvSpPr/>
+          <p:nvPr/>
+        </p:nvSpPr>
+        <p:spPr bwMode="auto">
+          <a:xfrm>
+            <a:off x="5535930" y="4648200"/>
+            <a:ext cx="2819400" cy="1143000"/>
+          </a:xfrm>
+          <a:prstGeom prst="rect">
+            <a:avLst/>
+          </a:prstGeom>
+          <a:ln>
+            <a:headEnd/>
+            <a:tailEnd/>
+          </a:ln>
+        </p:spPr>
+        <p:style>
+          <a:lnRef idx="2">
+            <a:schemeClr val="accent2">
+              <a:shade val="50000"/>
+            </a:schemeClr>
+          </a:lnRef>
+          <a:fillRef idx="1">
+            <a:schemeClr val="accent2"/>
+          </a:fillRef>
+          <a:effectRef idx="0">
+            <a:schemeClr val="accent2"/>
+          </a:effectRef>
+          <a:fontRef idx="minor">
+            <a:schemeClr val="lt1"/>
+          </a:fontRef>
+        </p:style>
+        <p:txBody>
+          <a:bodyPr wrap="none" rtlCol="0" anchor="ctr"/>
+          <a:lstStyle/>
+          <a:p>
+            <a:pPr algn="ctr"/>
+            <a:r>
+              <a:rPr lang="en-US" sz="2000" dirty="0" smtClean="0">
+                <a:solidFill>
+                  <a:schemeClr val="tx1"/>
+                </a:solidFill>
+                <a:latin typeface="Tekton Pro" pitchFamily="34" charset="0"/>
+              </a:rPr>
+              <a:t>@Component</a:t>
+            </a:r>
+            <a:endParaRPr lang="en-US" sz="2000" dirty="0">
+              <a:solidFill>
+                <a:schemeClr val="tx1"/>
+              </a:solidFill>
+              <a:latin typeface="Tekton Pro" pitchFamily="34" charset="0"/>
+            </a:endParaRPr>
+          </a:p>
+        </p:txBody>
+      </p:sp>
+      <p:sp>
+        <p:nvSpPr>
+          <p:cNvPr id="6" name="Up Arrow 5"/>
+          <p:cNvSpPr/>
+          <p:nvPr/>
+        </p:nvSpPr>
+        <p:spPr bwMode="auto">
+          <a:xfrm>
+            <a:off x="5543550" y="2171700"/>
+            <a:ext cx="914400" cy="2667000"/>
+          </a:xfrm>
+          <a:prstGeom prst="upArrow">
+            <a:avLst/>
+          </a:prstGeom>
+          <a:ln>
+            <a:headEnd/>
+            <a:tailEnd/>
+          </a:ln>
+        </p:spPr>
+        <p:style>
+          <a:lnRef idx="2">
+            <a:schemeClr val="accent6">
+              <a:shade val="50000"/>
+            </a:schemeClr>
+          </a:lnRef>
+          <a:fillRef idx="1">
+            <a:schemeClr val="accent6"/>
+          </a:fillRef>
+          <a:effectRef idx="0">
+            <a:schemeClr val="accent6"/>
+          </a:effectRef>
+          <a:fontRef idx="minor">
+            <a:schemeClr val="lt1"/>
+          </a:fontRef>
+        </p:style>
+        <p:txBody>
+          <a:bodyPr vert="vert" wrap="none" rtlCol="0" anchor="ctr"/>
+          <a:lstStyle/>
+          <a:p>
+            <a:pPr algn="ctr"/>
+            <a:r>
+              <a:rPr lang="en-US" sz="2000" dirty="0" smtClean="0">
+                <a:latin typeface="Tekton Pro" pitchFamily="34" charset="0"/>
+              </a:rPr>
+              <a:t>properties</a:t>
+            </a:r>
+            <a:endParaRPr lang="en-US" sz="2000" dirty="0">
+              <a:latin typeface="Tekton Pro" pitchFamily="34" charset="0"/>
+            </a:endParaRPr>
+          </a:p>
+        </p:txBody>
+      </p:sp>
+      <p:sp>
+        <p:nvSpPr>
+          <p:cNvPr id="9" name="Up Arrow 8"/>
+          <p:cNvSpPr/>
+          <p:nvPr/>
+        </p:nvSpPr>
+        <p:spPr bwMode="auto">
+          <a:xfrm rot="10800000">
+            <a:off x="7463790" y="2209800"/>
+            <a:ext cx="914400" cy="2667000"/>
+          </a:xfrm>
+          <a:prstGeom prst="upArrow">
+            <a:avLst/>
+          </a:prstGeom>
+          <a:ln>
+            <a:headEnd/>
+            <a:tailEnd/>
+          </a:ln>
+        </p:spPr>
+        <p:style>
+          <a:lnRef idx="2">
+            <a:schemeClr val="accent6">
+              <a:shade val="50000"/>
+            </a:schemeClr>
+          </a:lnRef>
+          <a:fillRef idx="1">
+            <a:schemeClr val="accent6"/>
+          </a:fillRef>
+          <a:effectRef idx="0">
+            <a:schemeClr val="accent6"/>
+          </a:effectRef>
+          <a:fontRef idx="minor">
+            <a:schemeClr val="lt1"/>
+          </a:fontRef>
+        </p:style>
+        <p:txBody>
+          <a:bodyPr vert="vert270" wrap="none" rtlCol="0" anchor="ctr"/>
+          <a:lstStyle/>
+          <a:p>
+            <a:pPr algn="ctr"/>
+            <a:r>
+              <a:rPr lang="en-US" sz="2000" dirty="0" smtClean="0">
+                <a:latin typeface="Tekton Pro" pitchFamily="34" charset="0"/>
+              </a:rPr>
+              <a:t>events</a:t>
+            </a:r>
+            <a:endParaRPr lang="en-US" sz="2000" dirty="0">
+              <a:latin typeface="Tekton Pro" pitchFamily="34" charset="0"/>
+            </a:endParaRPr>
+          </a:p>
+        </p:txBody>
+      </p:sp>
+    </p:spTree>
+    <p:extLst>
+      <p:ext uri="{BB962C8B-B14F-4D97-AF65-F5344CB8AC3E}">
+        <p14:creationId xmlns:p14="http://schemas.microsoft.com/office/powerpoint/2010/main" val="122743222"/>
+      </p:ext>
+    </p:extLst>
+  </p:cSld>
+  <p:clrMapOvr>
+    <a:masterClrMapping/>
+  </p:clrMapOvr>
+  <p:transition>
+    <p:fade/>
+  </p:transition>
+  <p:timing>
+    <p:tnLst>
+      <p:par>
+        <p:cTn id="1" dur="indefinite" restart="never" nodeType="tmRoot">
+          <p:childTnLst>
+            <p:seq concurrent="1" nextAc="seek">
+              <p:cTn id="2" dur="indefinite" nodeType="mainSeq">
+                <p:childTnLst>
+                  <p:par>
+                    <p:cTn id="3" fill="hold">
+                      <p:stCondLst>
+                        <p:cond delay="indefinite"/>
+                      </p:stCondLst>
+                      <p:childTnLst>
+                        <p:par>
+                          <p:cTn id="4" fill="hold">
+                            <p:stCondLst>
+                              <p:cond delay="0"/>
+                            </p:stCondLst>
+                            <p:childTnLst>
+                              <p:par>
+                                <p:cTn id="5" presetID="10" presetClass="entr" presetSubtype="0" fill="hold" nodeType="clickEffect">
+                                  <p:stCondLst>
+                                    <p:cond delay="0"/>
+                                  </p:stCondLst>
+                                  <p:childTnLst>
+                                    <p:set>
+                                      <p:cBhvr>
+                                        <p:cTn id="6" dur="1" fill="hold">
+                                          <p:stCondLst>
+                                            <p:cond delay="0"/>
+                                          </p:stCondLst>
+                                        </p:cTn>
+                                        <p:tgtEl>
+                                          <p:spTgt spid="3">
+                                            <p:txEl>
+                                              <p:pRg st="0" end="0"/>
+                                            </p:txEl>
+                                          </p:spTgt>
+                                        </p:tgtEl>
+                                        <p:attrNameLst>
+                                          <p:attrName>style.visibility</p:attrName>
+                                        </p:attrNameLst>
+                                      </p:cBhvr>
+                                      <p:to>
+                                        <p:strVal val="visible"/>
+                                      </p:to>
+                                    </p:set>
+                                    <p:animEffect transition="in" filter="fade">
+                                      <p:cBhvr>
+                                        <p:cTn id="7" dur="500"/>
+                                        <p:tgtEl>
+                                          <p:spTgt spid="3">
+                                            <p:txEl>
+                                              <p:pRg st="0" end="0"/>
+                                            </p:txEl>
+                                          </p:spTgt>
+                                        </p:tgtEl>
+                                      </p:cBhvr>
+                                    </p:animEffect>
+                                  </p:childTnLst>
+                                </p:cTn>
+                              </p:par>
+                              <p:par>
+                                <p:cTn id="8" presetID="10" presetClass="entr" presetSubtype="0" fill="hold" nodeType="withEffect">
+                                  <p:stCondLst>
+                                    <p:cond delay="0"/>
+                                  </p:stCondLst>
+                                  <p:childTnLst>
+                                    <p:set>
+                                      <p:cBhvr>
+                                        <p:cTn id="9" dur="1" fill="hold">
+                                          <p:stCondLst>
+                                            <p:cond delay="0"/>
+                                          </p:stCondLst>
+                                        </p:cTn>
+                                        <p:tgtEl>
+                                          <p:spTgt spid="3">
+                                            <p:txEl>
+                                              <p:pRg st="1" end="1"/>
+                                            </p:txEl>
+                                          </p:spTgt>
+                                        </p:tgtEl>
+                                        <p:attrNameLst>
+                                          <p:attrName>style.visibility</p:attrName>
+                                        </p:attrNameLst>
+                                      </p:cBhvr>
+                                      <p:to>
+                                        <p:strVal val="visible"/>
+                                      </p:to>
+                                    </p:set>
+                                    <p:animEffect transition="in" filter="fade">
+                                      <p:cBhvr>
+                                        <p:cTn id="10" dur="500"/>
+                                        <p:tgtEl>
+                                          <p:spTgt spid="3">
+                                            <p:txEl>
+                                              <p:pRg st="1" end="1"/>
+                                            </p:txEl>
+                                          </p:spTgt>
+                                        </p:tgtEl>
+                                      </p:cBhvr>
+                                    </p:animEffect>
+                                  </p:childTnLst>
+                                </p:cTn>
+                              </p:par>
+                            </p:childTnLst>
+                          </p:cTn>
+                        </p:par>
+                      </p:childTnLst>
+                    </p:cTn>
+                  </p:par>
+                  <p:par>
+                    <p:cTn id="11" fill="hold">
+                      <p:stCondLst>
+                        <p:cond delay="indefinite"/>
+                      </p:stCondLst>
+                      <p:childTnLst>
+                        <p:par>
+                          <p:cTn id="12" fill="hold">
+                            <p:stCondLst>
+                              <p:cond delay="0"/>
+                            </p:stCondLst>
+                            <p:childTnLst>
+                              <p:par>
+                                <p:cTn id="13" presetID="10" presetClass="entr" presetSubtype="0" fill="hold" grpId="0" nodeType="clickEffect">
+                                  <p:stCondLst>
+                                    <p:cond delay="0"/>
+                                  </p:stCondLst>
+                                  <p:childTnLst>
+                                    <p:set>
+                                      <p:cBhvr>
+                                        <p:cTn id="14" dur="1" fill="hold">
+                                          <p:stCondLst>
+                                            <p:cond delay="0"/>
+                                          </p:stCondLst>
+                                        </p:cTn>
+                                        <p:tgtEl>
+                                          <p:spTgt spid="5"/>
+                                        </p:tgtEl>
+                                        <p:attrNameLst>
+                                          <p:attrName>style.visibility</p:attrName>
+                                        </p:attrNameLst>
+                                      </p:cBhvr>
+                                      <p:to>
+                                        <p:strVal val="visible"/>
+                                      </p:to>
+                                    </p:set>
+                                    <p:animEffect transition="in" filter="fade">
+                                      <p:cBhvr>
+                                        <p:cTn id="15" dur="500"/>
+                                        <p:tgtEl>
+                                          <p:spTgt spid="5"/>
+                                        </p:tgtEl>
+                                      </p:cBhvr>
+                                    </p:animEffect>
+                                  </p:childTnLst>
+                                </p:cTn>
+                              </p:par>
+                            </p:childTnLst>
+                          </p:cTn>
+                        </p:par>
+                      </p:childTnLst>
+                    </p:cTn>
+                  </p:par>
+                  <p:par>
+                    <p:cTn id="16" fill="hold">
+                      <p:stCondLst>
+                        <p:cond delay="indefinite"/>
+                      </p:stCondLst>
+                      <p:childTnLst>
+                        <p:par>
+                          <p:cTn id="17" fill="hold">
+                            <p:stCondLst>
+                              <p:cond delay="0"/>
+                            </p:stCondLst>
+                            <p:childTnLst>
+                              <p:par>
+                                <p:cTn id="18" presetID="10" presetClass="entr" presetSubtype="0" fill="hold" nodeType="clickEffect">
+                                  <p:stCondLst>
+                                    <p:cond delay="0"/>
+                                  </p:stCondLst>
+                                  <p:childTnLst>
+                                    <p:set>
+                                      <p:cBhvr>
+                                        <p:cTn id="19" dur="1" fill="hold">
+                                          <p:stCondLst>
+                                            <p:cond delay="0"/>
+                                          </p:stCondLst>
+                                        </p:cTn>
+                                        <p:tgtEl>
+                                          <p:spTgt spid="3">
+                                            <p:txEl>
+                                              <p:pRg st="2" end="2"/>
+                                            </p:txEl>
+                                          </p:spTgt>
+                                        </p:tgtEl>
+                                        <p:attrNameLst>
+                                          <p:attrName>style.visibility</p:attrName>
+                                        </p:attrNameLst>
+                                      </p:cBhvr>
+                                      <p:to>
+                                        <p:strVal val="visible"/>
+                                      </p:to>
+                                    </p:set>
+                                    <p:animEffect transition="in" filter="fade">
+                                      <p:cBhvr>
+                                        <p:cTn id="20" dur="500"/>
+                                        <p:tgtEl>
+                                          <p:spTgt spid="3">
+                                            <p:txEl>
+                                              <p:pRg st="2" end="2"/>
+                                            </p:txEl>
+                                          </p:spTgt>
+                                        </p:tgtEl>
+                                      </p:cBhvr>
+                                    </p:animEffect>
+                                  </p:childTnLst>
+                                </p:cTn>
+                              </p:par>
+                              <p:par>
+                                <p:cTn id="21" presetID="10" presetClass="entr" presetSubtype="0" fill="hold" nodeType="withEffect">
+                                  <p:stCondLst>
+                                    <p:cond delay="0"/>
+                                  </p:stCondLst>
+                                  <p:childTnLst>
+                                    <p:set>
+                                      <p:cBhvr>
+                                        <p:cTn id="22" dur="1" fill="hold">
+                                          <p:stCondLst>
+                                            <p:cond delay="0"/>
+                                          </p:stCondLst>
+                                        </p:cTn>
+                                        <p:tgtEl>
+                                          <p:spTgt spid="3">
+                                            <p:txEl>
+                                              <p:pRg st="3" end="3"/>
+                                            </p:txEl>
+                                          </p:spTgt>
+                                        </p:tgtEl>
+                                        <p:attrNameLst>
+                                          <p:attrName>style.visibility</p:attrName>
+                                        </p:attrNameLst>
+                                      </p:cBhvr>
+                                      <p:to>
+                                        <p:strVal val="visible"/>
+                                      </p:to>
+                                    </p:set>
+                                    <p:animEffect transition="in" filter="fade">
+                                      <p:cBhvr>
+                                        <p:cTn id="23" dur="500"/>
+                                        <p:tgtEl>
+                                          <p:spTgt spid="3">
+                                            <p:txEl>
+                                              <p:pRg st="3" end="3"/>
+                                            </p:txEl>
+                                          </p:spTgt>
+                                        </p:tgtEl>
+                                      </p:cBhvr>
+                                    </p:animEffect>
+                                  </p:childTnLst>
+                                </p:cTn>
+                              </p:par>
+                            </p:childTnLst>
+                          </p:cTn>
+                        </p:par>
+                      </p:childTnLst>
+                    </p:cTn>
+                  </p:par>
+                  <p:par>
+                    <p:cTn id="24" fill="hold">
+                      <p:stCondLst>
+                        <p:cond delay="indefinite"/>
+                      </p:stCondLst>
+                      <p:childTnLst>
+                        <p:par>
+                          <p:cTn id="25" fill="hold">
+                            <p:stCondLst>
+                              <p:cond delay="0"/>
+                            </p:stCondLst>
+                            <p:childTnLst>
+                              <p:par>
+                                <p:cTn id="26" presetID="10" presetClass="entr" presetSubtype="0" fill="hold" grpId="0" nodeType="clickEffect">
+                                  <p:stCondLst>
+                                    <p:cond delay="0"/>
+                                  </p:stCondLst>
+                                  <p:childTnLst>
+                                    <p:set>
+                                      <p:cBhvr>
+                                        <p:cTn id="27" dur="1" fill="hold">
+                                          <p:stCondLst>
+                                            <p:cond delay="0"/>
+                                          </p:stCondLst>
+                                        </p:cTn>
+                                        <p:tgtEl>
+                                          <p:spTgt spid="4"/>
+                                        </p:tgtEl>
+                                        <p:attrNameLst>
+                                          <p:attrName>style.visibility</p:attrName>
+                                        </p:attrNameLst>
+                                      </p:cBhvr>
+                                      <p:to>
+                                        <p:strVal val="visible"/>
+                                      </p:to>
+                                    </p:set>
+                                    <p:animEffect transition="in" filter="fade">
+                                      <p:cBhvr>
+                                        <p:cTn id="28" dur="500"/>
+                                        <p:tgtEl>
+                                          <p:spTgt spid="4"/>
+                                        </p:tgtEl>
+                                      </p:cBhvr>
+                                    </p:animEffect>
+                                  </p:childTnLst>
+                                </p:cTn>
+                              </p:par>
+                            </p:childTnLst>
+                          </p:cTn>
+                        </p:par>
+                      </p:childTnLst>
+                    </p:cTn>
+                  </p:par>
+                  <p:par>
+                    <p:cTn id="29" fill="hold">
+                      <p:stCondLst>
+                        <p:cond delay="indefinite"/>
+                      </p:stCondLst>
+                      <p:childTnLst>
+                        <p:par>
+                          <p:cTn id="30" fill="hold">
+                            <p:stCondLst>
+                              <p:cond delay="0"/>
+                            </p:stCondLst>
+                            <p:childTnLst>
+                              <p:par>
+                                <p:cTn id="31" presetID="10" presetClass="entr" presetSubtype="0" fill="hold" grpId="0" nodeType="clickEffect">
+                                  <p:stCondLst>
+                                    <p:cond delay="0"/>
+                                  </p:stCondLst>
+                                  <p:childTnLst>
+                                    <p:set>
+                                      <p:cBhvr>
+                                        <p:cTn id="32" dur="1" fill="hold">
+                                          <p:stCondLst>
+                                            <p:cond delay="0"/>
+                                          </p:stCondLst>
+                                        </p:cTn>
+                                        <p:tgtEl>
+                                          <p:spTgt spid="6"/>
+                                        </p:tgtEl>
+                                        <p:attrNameLst>
+                                          <p:attrName>style.visibility</p:attrName>
+                                        </p:attrNameLst>
+                                      </p:cBhvr>
+                                      <p:to>
+                                        <p:strVal val="visible"/>
+                                      </p:to>
+                                    </p:set>
+                                    <p:animEffect transition="in" filter="fade">
+                                      <p:cBhvr>
+                                        <p:cTn id="33" dur="500"/>
+                                        <p:tgtEl>
+                                          <p:spTgt spid="6"/>
+                                        </p:tgtEl>
+                                      </p:cBhvr>
+                                    </p:animEffect>
+                                  </p:childTnLst>
+                                </p:cTn>
+                              </p:par>
+                            </p:childTnLst>
+                          </p:cTn>
+                        </p:par>
+                      </p:childTnLst>
+                    </p:cTn>
+                  </p:par>
+                  <p:par>
+                    <p:cTn id="34" fill="hold">
+                      <p:stCondLst>
+                        <p:cond delay="indefinite"/>
+                      </p:stCondLst>
+                      <p:childTnLst>
+                        <p:par>
+                          <p:cTn id="35" fill="hold">
+                            <p:stCondLst>
+                              <p:cond delay="0"/>
+                            </p:stCondLst>
+                            <p:childTnLst>
+                              <p:par>
+                                <p:cTn id="36" presetID="10" presetClass="entr" presetSubtype="0" fill="hold" grpId="0" nodeType="clickEffect">
+                                  <p:stCondLst>
+                                    <p:cond delay="0"/>
+                                  </p:stCondLst>
+                                  <p:childTnLst>
+                                    <p:set>
+                                      <p:cBhvr>
+                                        <p:cTn id="37" dur="1" fill="hold">
+                                          <p:stCondLst>
+                                            <p:cond delay="0"/>
+                                          </p:stCondLst>
+                                        </p:cTn>
+                                        <p:tgtEl>
+                                          <p:spTgt spid="9"/>
+                                        </p:tgtEl>
+                                        <p:attrNameLst>
+                                          <p:attrName>style.visibility</p:attrName>
+                                        </p:attrNameLst>
+                                      </p:cBhvr>
+                                      <p:to>
+                                        <p:strVal val="visible"/>
+                                      </p:to>
+                                    </p:set>
+                                    <p:animEffect transition="in" filter="fade">
+                                      <p:cBhvr>
+                                        <p:cTn id="38" dur="500"/>
+                                        <p:tgtEl>
+                                          <p:spTgt spid="9"/>
+                                        </p:tgtEl>
+                                      </p:cBhvr>
+                                    </p:animEffect>
+                                  </p:childTnLst>
+                                </p:cTn>
+                              </p:par>
+                            </p:childTnLst>
+                          </p:cTn>
+                        </p:par>
+                      </p:childTnLst>
+                    </p:cTn>
+                  </p:par>
+                </p:childTnLst>
+              </p:cTn>
+              <p:prevCondLst>
+                <p:cond evt="onPrev" delay="0">
+                  <p:tgtEl>
+                    <p:sldTgt/>
+                  </p:tgtEl>
+                </p:cond>
+              </p:prevCondLst>
+              <p:nextCondLst>
+                <p:cond evt="onNext" delay="0">
+                  <p:tgtEl>
+                    <p:sldTgt/>
+                  </p:tgtEl>
+                </p:cond>
+              </p:nextCondLst>
+            </p:seq>
+          </p:childTnLst>
+        </p:cTn>
+      </p:par>
+    </p:tnLst>
+    <p:bldLst>
+      <p:bldP spid="4" grpId="0" animBg="1"/>
+      <p:bldP spid="5" grpId="0" animBg="1"/>
+      <p:bldP spid="6" grpId="0" animBg="1"/>
+      <p:bldP spid="9" grpId="0" animBg="1"/>
+    </p:bldLst>
+  </p:timing>
+</p:sld>
+</file>
+
+<file path=ppt/slides/slide14.xml><?xml version="1.0" encoding="utf-8"?>
+<p:sld xmlns:a="http://schemas.openxmlformats.org/drawingml/2006/main" xmlns:r="http://schemas.openxmlformats.org/officeDocument/2006/relationships" xmlns:p="http://schemas.openxmlformats.org/presentationml/2006/main">
+  <p:cSld>
+    <p:spTree>
+      <p:nvGrpSpPr>
+        <p:cNvPr id="1" name=""/>
+        <p:cNvGrpSpPr/>
+        <p:nvPr/>
+      </p:nvGrpSpPr>
+      <p:grpSpPr>
+        <a:xfrm>
+          <a:off x="0" y="0"/>
+          <a:ext cx="0" cy="0"/>
+          <a:chOff x="0" y="0"/>
+          <a:chExt cx="0" cy="0"/>
+        </a:xfrm>
+      </p:grpSpPr>
+      <p:sp>
+        <p:nvSpPr>
+          <p:cNvPr id="2" name="Title 1"/>
+          <p:cNvSpPr>
+            <a:spLocks noGrp="1"/>
+          </p:cNvSpPr>
+          <p:nvPr>
+            <p:ph type="title"/>
+          </p:nvPr>
+        </p:nvSpPr>
+        <p:spPr/>
+        <p:txBody>
+          <a:bodyPr/>
+          <a:lstStyle/>
+          <a:p>
+            <a:r>
+              <a:rPr lang="en-US" dirty="0" smtClean="0"/>
+              <a:t>Template Syntax</a:t>
+            </a:r>
+            <a:endParaRPr lang="en-US" dirty="0"/>
+          </a:p>
+        </p:txBody>
+      </p:sp>
+      <p:sp>
+        <p:nvSpPr>
+          <p:cNvPr id="3" name="Text Placeholder 2"/>
+          <p:cNvSpPr>
+            <a:spLocks noGrp="1"/>
+          </p:cNvSpPr>
+          <p:nvPr>
+            <p:ph type="body" idx="1"/>
+          </p:nvPr>
+        </p:nvSpPr>
+        <p:spPr/>
+        <p:txBody>
+          <a:bodyPr/>
+          <a:lstStyle/>
+          <a:p>
+            <a:r>
+              <a:rPr lang="en-US" dirty="0" smtClean="0"/>
+              <a:t>Display text using {{expressions}}</a:t>
+            </a:r>
+          </a:p>
+          <a:p>
+            <a:r>
+              <a:rPr lang="en-US" dirty="0" smtClean="0"/>
+              <a:t>Set properties using [expressions]</a:t>
+            </a:r>
+          </a:p>
+          <a:p>
+            <a:r>
+              <a:rPr lang="en-US" dirty="0" smtClean="0"/>
+              <a:t>Handle events using (expressions)</a:t>
+            </a:r>
+          </a:p>
+          <a:p>
+            <a:pPr lvl="1"/>
+            <a:r>
+              <a:rPr lang="en-US" dirty="0" smtClean="0"/>
+              <a:t>[] () deal with properties, not attributes</a:t>
+            </a:r>
+          </a:p>
+          <a:p>
+            <a:pPr lvl="1"/>
+            <a:r>
+              <a:rPr lang="en-US" dirty="0" smtClean="0"/>
+              <a:t>Expressions limit side effects and global scope</a:t>
+            </a:r>
+          </a:p>
+          <a:p>
+            <a:endParaRPr lang="en-US" dirty="0" smtClean="0"/>
+          </a:p>
+        </p:txBody>
+      </p:sp>
+      <p:pic>
+        <p:nvPicPr>
+          <p:cNvPr id="4" name="Picture 3"/>
+          <p:cNvPicPr>
+            <a:picLocks noChangeAspect="1"/>
+          </p:cNvPicPr>
+          <p:nvPr/>
+        </p:nvPicPr>
+        <p:blipFill>
+          <a:blip r:embed="rId2"/>
+          <a:stretch>
+            <a:fillRect/>
+          </a:stretch>
+        </p:blipFill>
+        <p:spPr>
+          <a:xfrm>
+            <a:off x="1524000" y="3581400"/>
+            <a:ext cx="5629275" cy="2247900"/>
+          </a:xfrm>
+          <a:prstGeom prst="rect">
+            <a:avLst/>
+          </a:prstGeom>
+        </p:spPr>
+      </p:pic>
+    </p:spTree>
+    <p:extLst>
+      <p:ext uri="{BB962C8B-B14F-4D97-AF65-F5344CB8AC3E}">
+        <p14:creationId xmlns:p14="http://schemas.microsoft.com/office/powerpoint/2010/main" val="1735851690"/>
+      </p:ext>
+    </p:extLst>
+  </p:cSld>
+  <p:clrMapOvr>
+    <a:masterClrMapping/>
+  </p:clrMapOvr>
+  <p:transition>
+    <p:fade/>
+  </p:transition>
+  <p:timing>
+    <p:tnLst>
+      <p:par>
+        <p:cTn id="1" dur="indefinite" restart="never" nodeType="tmRoot">
+          <p:childTnLst>
+            <p:seq concurrent="1" nextAc="seek">
+              <p:cTn id="2" dur="indefinite" nodeType="mainSeq">
+                <p:childTnLst>
+                  <p:par>
+                    <p:cTn id="3" fill="hold">
+                      <p:stCondLst>
+                        <p:cond delay="indefinite"/>
+                      </p:stCondLst>
+                      <p:childTnLst>
+                        <p:par>
+                          <p:cTn id="4" fill="hold">
+                            <p:stCondLst>
+                              <p:cond delay="0"/>
+                            </p:stCondLst>
+                            <p:childTnLst>
+                              <p:par>
+                                <p:cTn id="5" presetID="10" presetClass="entr" presetSubtype="0" fill="hold" nodeType="clickEffect">
+                                  <p:stCondLst>
+                                    <p:cond delay="0"/>
+                                  </p:stCondLst>
+                                  <p:childTnLst>
+                                    <p:set>
+                                      <p:cBhvr>
+                                        <p:cTn id="6" dur="1" fill="hold">
+                                          <p:stCondLst>
+                                            <p:cond delay="0"/>
+                                          </p:stCondLst>
+                                        </p:cTn>
+                                        <p:tgtEl>
+                                          <p:spTgt spid="3">
+                                            <p:txEl>
+                                              <p:pRg st="1" end="1"/>
+                                            </p:txEl>
+                                          </p:spTgt>
+                                        </p:tgtEl>
+                                        <p:attrNameLst>
+                                          <p:attrName>style.visibility</p:attrName>
+                                        </p:attrNameLst>
+                                      </p:cBhvr>
+                                      <p:to>
+                                        <p:strVal val="visible"/>
+                                      </p:to>
+                                    </p:set>
+                                    <p:animEffect transition="in" filter="fade">
+                                      <p:cBhvr>
+                                        <p:cTn id="7" dur="500"/>
+                                        <p:tgtEl>
+                                          <p:spTgt spid="3">
+                                            <p:txEl>
+                                              <p:pRg st="1" end="1"/>
+                                            </p:txEl>
+                                          </p:spTgt>
+                                        </p:tgtEl>
+                                      </p:cBhvr>
+                                    </p:animEffect>
+                                  </p:childTnLst>
+                                </p:cTn>
+                              </p:par>
+                            </p:childTnLst>
+                          </p:cTn>
+                        </p:par>
+                      </p:childTnLst>
+                    </p:cTn>
+                  </p:par>
+                  <p:par>
+                    <p:cTn id="8" fill="hold">
+                      <p:stCondLst>
+                        <p:cond delay="indefinite"/>
+                      </p:stCondLst>
+                      <p:childTnLst>
+                        <p:par>
+                          <p:cTn id="9" fill="hold">
+                            <p:stCondLst>
+                              <p:cond delay="0"/>
+                            </p:stCondLst>
+                            <p:childTnLst>
+                              <p:par>
+                                <p:cTn id="10" presetID="10" presetClass="entr" presetSubtype="0" fill="hold" nodeType="clickEffect">
+                                  <p:stCondLst>
+                                    <p:cond delay="0"/>
+                                  </p:stCondLst>
+                                  <p:childTnLst>
+                                    <p:set>
+                                      <p:cBhvr>
+                                        <p:cTn id="11" dur="1" fill="hold">
+                                          <p:stCondLst>
+                                            <p:cond delay="0"/>
+                                          </p:stCondLst>
+                                        </p:cTn>
+                                        <p:tgtEl>
+                                          <p:spTgt spid="3">
+                                            <p:txEl>
+                                              <p:pRg st="2" end="2"/>
+                                            </p:txEl>
+                                          </p:spTgt>
+                                        </p:tgtEl>
+                                        <p:attrNameLst>
+                                          <p:attrName>style.visibility</p:attrName>
+                                        </p:attrNameLst>
+                                      </p:cBhvr>
+                                      <p:to>
+                                        <p:strVal val="visible"/>
+                                      </p:to>
+                                    </p:set>
+                                    <p:animEffect transition="in" filter="fade">
+                                      <p:cBhvr>
+                                        <p:cTn id="12" dur="500"/>
+                                        <p:tgtEl>
+                                          <p:spTgt spid="3">
+                                            <p:txEl>
+                                              <p:pRg st="2" end="2"/>
+                                            </p:txEl>
+                                          </p:spTgt>
+                                        </p:tgtEl>
+                                      </p:cBhvr>
+                                    </p:animEffect>
+                                  </p:childTnLst>
+                                </p:cTn>
+                              </p:par>
+                            </p:childTnLst>
+                          </p:cTn>
+                        </p:par>
+                      </p:childTnLst>
+                    </p:cTn>
+                  </p:par>
+                  <p:par>
+                    <p:cTn id="13" fill="hold">
+                      <p:stCondLst>
+                        <p:cond delay="indefinite"/>
+                      </p:stCondLst>
+                      <p:childTnLst>
+                        <p:par>
+                          <p:cTn id="14" fill="hold">
+                            <p:stCondLst>
+                              <p:cond delay="0"/>
+                            </p:stCondLst>
+                            <p:childTnLst>
+                              <p:par>
+                                <p:cTn id="15" presetID="10" presetClass="entr" presetSubtype="0" fill="hold" nodeType="clickEffect">
+                                  <p:stCondLst>
+                                    <p:cond delay="0"/>
+                                  </p:stCondLst>
+                                  <p:childTnLst>
+                                    <p:set>
+                                      <p:cBhvr>
+                                        <p:cTn id="16" dur="1" fill="hold">
+                                          <p:stCondLst>
+                                            <p:cond delay="0"/>
+                                          </p:stCondLst>
+                                        </p:cTn>
+                                        <p:tgtEl>
+                                          <p:spTgt spid="3">
+                                            <p:txEl>
+                                              <p:pRg st="3" end="3"/>
+                                            </p:txEl>
+                                          </p:spTgt>
+                                        </p:tgtEl>
+                                        <p:attrNameLst>
+                                          <p:attrName>style.visibility</p:attrName>
+                                        </p:attrNameLst>
+                                      </p:cBhvr>
+                                      <p:to>
+                                        <p:strVal val="visible"/>
+                                      </p:to>
+                                    </p:set>
+                                    <p:animEffect transition="in" filter="fade">
+                                      <p:cBhvr>
+                                        <p:cTn id="17" dur="500"/>
+                                        <p:tgtEl>
+                                          <p:spTgt spid="3">
+                                            <p:txEl>
+                                              <p:pRg st="3" end="3"/>
+                                            </p:txEl>
+                                          </p:spTgt>
+                                        </p:tgtEl>
+                                      </p:cBhvr>
+                                    </p:animEffect>
+                                  </p:childTnLst>
+                                </p:cTn>
+                              </p:par>
+                            </p:childTnLst>
+                          </p:cTn>
+                        </p:par>
+                      </p:childTnLst>
+                    </p:cTn>
+                  </p:par>
+                  <p:par>
+                    <p:cTn id="18" fill="hold">
+                      <p:stCondLst>
+                        <p:cond delay="indefinite"/>
+                      </p:stCondLst>
+                      <p:childTnLst>
+                        <p:par>
+                          <p:cTn id="19" fill="hold">
+                            <p:stCondLst>
+                              <p:cond delay="0"/>
+                            </p:stCondLst>
+                            <p:childTnLst>
+                              <p:par>
+                                <p:cTn id="20" presetID="10" presetClass="entr" presetSubtype="0" fill="hold" nodeType="clickEffect">
+                                  <p:stCondLst>
+                                    <p:cond delay="0"/>
+                                  </p:stCondLst>
+                                  <p:childTnLst>
+                                    <p:set>
+                                      <p:cBhvr>
+                                        <p:cTn id="21" dur="1" fill="hold">
+                                          <p:stCondLst>
+                                            <p:cond delay="0"/>
+                                          </p:stCondLst>
+                                        </p:cTn>
+                                        <p:tgtEl>
+                                          <p:spTgt spid="3">
+                                            <p:txEl>
+                                              <p:pRg st="4" end="4"/>
+                                            </p:txEl>
+                                          </p:spTgt>
+                                        </p:tgtEl>
+                                        <p:attrNameLst>
+                                          <p:attrName>style.visibility</p:attrName>
+                                        </p:attrNameLst>
+                                      </p:cBhvr>
+                                      <p:to>
+                                        <p:strVal val="visible"/>
+                                      </p:to>
+                                    </p:set>
+                                    <p:animEffect transition="in" filter="fade">
+                                      <p:cBhvr>
+                                        <p:cTn id="22" dur="500"/>
+                                        <p:tgtEl>
+                                          <p:spTgt spid="3">
+                                            <p:txEl>
+                                              <p:pRg st="4" end="4"/>
+                                            </p:txEl>
+                                          </p:spTgt>
+                                        </p:tgtEl>
+                                      </p:cBhvr>
+                                    </p:animEffect>
+                                  </p:childTnLst>
+                                </p:cTn>
+                              </p:par>
+                            </p:childTnLst>
+                          </p:cTn>
+                        </p:par>
+                      </p:childTnLst>
+                    </p:cTn>
+                  </p:par>
+                </p:childTnLst>
+              </p:cTn>
+              <p:prevCondLst>
+                <p:cond evt="onPrev" delay="0">
+                  <p:tgtEl>
+                    <p:sldTgt/>
+                  </p:tgtEl>
+                </p:cond>
+              </p:prevCondLst>
+              <p:nextCondLst>
+                <p:cond evt="onNext" delay="0">
+                  <p:tgtEl>
+                    <p:sldTgt/>
+                  </p:tgtEl>
+                </p:cond>
+              </p:nextCondLst>
+            </p:seq>
+          </p:childTnLst>
+        </p:cTn>
+      </p:par>
+    </p:tnLst>
+  </p:timing>
+</p:sld>
+</file>
+
+<file path=ppt/slides/slide15.xml><?xml version="1.0" encoding="utf-8"?>
+<p:sld xmlns:a="http://schemas.openxmlformats.org/drawingml/2006/main" xmlns:r="http://schemas.openxmlformats.org/officeDocument/2006/relationships" xmlns:p="http://schemas.openxmlformats.org/presentationml/2006/main">
+  <p:cSld>
+    <p:spTree>
+      <p:nvGrpSpPr>
+        <p:cNvPr id="1" name=""/>
+        <p:cNvGrpSpPr/>
+        <p:nvPr/>
+      </p:nvGrpSpPr>
+      <p:grpSpPr>
+        <a:xfrm>
+          <a:off x="0" y="0"/>
+          <a:ext cx="0" cy="0"/>
+          <a:chOff x="0" y="0"/>
+          <a:chExt cx="0" cy="0"/>
+        </a:xfrm>
+      </p:grpSpPr>
+      <p:sp>
+        <p:nvSpPr>
+          <p:cNvPr id="2" name="Title 1"/>
+          <p:cNvSpPr>
+            <a:spLocks noGrp="1"/>
+          </p:cNvSpPr>
+          <p:nvPr>
+            <p:ph type="title"/>
+          </p:nvPr>
+        </p:nvSpPr>
+        <p:spPr/>
+        <p:txBody>
+          <a:bodyPr/>
+          <a:lstStyle/>
+          <a:p>
+            <a:r>
+              <a:rPr lang="en-US" dirty="0" smtClean="0"/>
+              <a:t>Inputs</a:t>
+            </a:r>
+            <a:endParaRPr lang="en-US" dirty="0"/>
+          </a:p>
+        </p:txBody>
+      </p:sp>
+      <p:sp>
+        <p:nvSpPr>
+          <p:cNvPr id="3" name="Text Placeholder 2"/>
+          <p:cNvSpPr>
+            <a:spLocks noGrp="1"/>
+          </p:cNvSpPr>
+          <p:nvPr>
+            <p:ph type="body" idx="1"/>
+          </p:nvPr>
+        </p:nvSpPr>
+        <p:spPr/>
+        <p:txBody>
+          <a:bodyPr/>
+          <a:lstStyle/>
+          <a:p>
+            <a:r>
+              <a:rPr lang="en-US" dirty="0" smtClean="0"/>
+              <a:t>Two way data binding and change notification</a:t>
+            </a:r>
+            <a:endParaRPr lang="en-US" dirty="0"/>
+          </a:p>
+        </p:txBody>
+      </p:sp>
+      <p:pic>
+        <p:nvPicPr>
+          <p:cNvPr id="4" name="Picture 3"/>
+          <p:cNvPicPr>
+            <a:picLocks noChangeAspect="1"/>
+          </p:cNvPicPr>
+          <p:nvPr/>
+        </p:nvPicPr>
+        <p:blipFill>
+          <a:blip r:embed="rId2"/>
+          <a:stretch>
+            <a:fillRect/>
+          </a:stretch>
+        </p:blipFill>
+        <p:spPr>
+          <a:xfrm>
+            <a:off x="397723" y="2667000"/>
+            <a:ext cx="8252066" cy="1604963"/>
+          </a:xfrm>
+          <a:prstGeom prst="rect">
+            <a:avLst/>
+          </a:prstGeom>
+        </p:spPr>
+      </p:pic>
+    </p:spTree>
+    <p:extLst>
+      <p:ext uri="{BB962C8B-B14F-4D97-AF65-F5344CB8AC3E}">
+        <p14:creationId xmlns:p14="http://schemas.microsoft.com/office/powerpoint/2010/main" val="3736789927"/>
+      </p:ext>
+    </p:extLst>
+  </p:cSld>
+  <p:clrMapOvr>
+    <a:masterClrMapping/>
+  </p:clrMapOvr>
+  <p:transition>
+    <p:fade/>
+  </p:transition>
+  <p:timing>
+    <p:tnLst>
+      <p:par>
+        <p:cTn id="1" dur="indefinite" restart="never" nodeType="tmRoot"/>
+      </p:par>
+    </p:tnLst>
+  </p:timing>
+</p:sld>
+</file>
+
+<file path=ppt/slides/slide16.xml><?xml version="1.0" encoding="utf-8"?>
+<p:sld xmlns:a="http://schemas.openxmlformats.org/drawingml/2006/main" xmlns:r="http://schemas.openxmlformats.org/officeDocument/2006/relationships" xmlns:p="http://schemas.openxmlformats.org/presentationml/2006/main">
+  <p:cSld>
+    <p:spTree>
+      <p:nvGrpSpPr>
+        <p:cNvPr id="1" name=""/>
+        <p:cNvGrpSpPr/>
+        <p:nvPr/>
+      </p:nvGrpSpPr>
+      <p:grpSpPr>
+        <a:xfrm>
+          <a:off x="0" y="0"/>
+          <a:ext cx="0" cy="0"/>
+          <a:chOff x="0" y="0"/>
+          <a:chExt cx="0" cy="0"/>
+        </a:xfrm>
+      </p:grpSpPr>
+      <p:sp>
+        <p:nvSpPr>
+          <p:cNvPr id="2" name="Title 1"/>
+          <p:cNvSpPr>
+            <a:spLocks noGrp="1"/>
+          </p:cNvSpPr>
+          <p:nvPr>
+            <p:ph type="title"/>
+          </p:nvPr>
+        </p:nvSpPr>
+        <p:spPr/>
+        <p:txBody>
+          <a:bodyPr/>
+          <a:lstStyle/>
+          <a:p>
+            <a:r>
+              <a:rPr lang="en-US" dirty="0" smtClean="0"/>
+              <a:t>Forms</a:t>
+            </a:r>
+            <a:endParaRPr lang="en-US" dirty="0"/>
+          </a:p>
+        </p:txBody>
+      </p:sp>
+      <p:sp>
+        <p:nvSpPr>
+          <p:cNvPr id="3" name="Text Placeholder 2"/>
+          <p:cNvSpPr>
+            <a:spLocks noGrp="1"/>
+          </p:cNvSpPr>
+          <p:nvPr>
+            <p:ph type="body" idx="1"/>
+          </p:nvPr>
+        </p:nvSpPr>
+        <p:spPr/>
+        <p:txBody>
+          <a:bodyPr/>
+          <a:lstStyle/>
+          <a:p>
+            <a:r>
+              <a:rPr lang="en-US" dirty="0" smtClean="0"/>
+              <a:t>Support for validation and dirty flags</a:t>
+            </a:r>
+          </a:p>
+          <a:p>
+            <a:r>
+              <a:rPr lang="en-US" dirty="0" smtClean="0"/>
+              <a:t>Use </a:t>
+            </a:r>
+            <a:r>
+              <a:rPr lang="en-US" dirty="0" err="1" smtClean="0"/>
+              <a:t>ngModel</a:t>
+            </a:r>
+            <a:r>
+              <a:rPr lang="en-US" dirty="0" smtClean="0"/>
+              <a:t> in combination with:</a:t>
+            </a:r>
+          </a:p>
+          <a:p>
+            <a:pPr lvl="1"/>
+            <a:r>
+              <a:rPr lang="en-US" dirty="0" err="1" smtClean="0"/>
+              <a:t>ngSubmit</a:t>
+            </a:r>
+            <a:endParaRPr lang="en-US" dirty="0" smtClean="0"/>
+          </a:p>
+          <a:p>
+            <a:pPr lvl="1"/>
+            <a:r>
+              <a:rPr lang="en-US" dirty="0" err="1" smtClean="0"/>
+              <a:t>ngControl</a:t>
+            </a:r>
+            <a:endParaRPr lang="en-US" dirty="0" smtClean="0"/>
+          </a:p>
+          <a:p>
+            <a:pPr lvl="1"/>
+            <a:r>
+              <a:rPr lang="en-US" dirty="0" err="1" smtClean="0"/>
+              <a:t>ngForm</a:t>
+            </a:r>
+            <a:endParaRPr lang="en-US" dirty="0"/>
+          </a:p>
+        </p:txBody>
+      </p:sp>
+      <p:pic>
+        <p:nvPicPr>
+          <p:cNvPr id="4" name="Picture 3"/>
+          <p:cNvPicPr>
+            <a:picLocks noChangeAspect="1"/>
+          </p:cNvPicPr>
+          <p:nvPr/>
+        </p:nvPicPr>
+        <p:blipFill>
+          <a:blip r:embed="rId2"/>
+          <a:stretch>
+            <a:fillRect/>
+          </a:stretch>
+        </p:blipFill>
+        <p:spPr>
+          <a:xfrm>
+            <a:off x="1905000" y="3695700"/>
+            <a:ext cx="4229100" cy="1590675"/>
+          </a:xfrm>
+          <a:prstGeom prst="rect">
+            <a:avLst/>
+          </a:prstGeom>
+        </p:spPr>
+      </p:pic>
+    </p:spTree>
+    <p:extLst>
+      <p:ext uri="{BB962C8B-B14F-4D97-AF65-F5344CB8AC3E}">
+        <p14:creationId xmlns:p14="http://schemas.microsoft.com/office/powerpoint/2010/main" val="4044431088"/>
+      </p:ext>
+    </p:extLst>
+  </p:cSld>
+  <p:clrMapOvr>
+    <a:masterClrMapping/>
+  </p:clrMapOvr>
+  <p:transition>
+    <p:fade/>
+  </p:transition>
+  <p:timing>
+    <p:tnLst>
+      <p:par>
+        <p:cTn id="1" dur="indefinite" restart="never" nodeType="tmRoot"/>
+      </p:par>
+    </p:tnLst>
+  </p:timing>
+</p:sld>
+</file>
+
+<file path=ppt/slides/slide17.xml><?xml version="1.0" encoding="utf-8"?>
+<p:sld xmlns:a="http://schemas.openxmlformats.org/drawingml/2006/main" xmlns:r="http://schemas.openxmlformats.org/officeDocument/2006/relationships" xmlns:p="http://schemas.openxmlformats.org/presentationml/2006/main">
+  <p:cSld>
+    <p:spTree>
+      <p:nvGrpSpPr>
+        <p:cNvPr id="1" name=""/>
+        <p:cNvGrpSpPr/>
+        <p:nvPr/>
+      </p:nvGrpSpPr>
+      <p:grpSpPr>
+        <a:xfrm>
+          <a:off x="0" y="0"/>
+          <a:ext cx="0" cy="0"/>
+          <a:chOff x="0" y="0"/>
+          <a:chExt cx="0" cy="0"/>
+        </a:xfrm>
+      </p:grpSpPr>
+      <p:sp>
+        <p:nvSpPr>
+          <p:cNvPr id="2" name="Title 1"/>
+          <p:cNvSpPr>
+            <a:spLocks noGrp="1"/>
+          </p:cNvSpPr>
+          <p:nvPr>
+            <p:ph type="title"/>
+          </p:nvPr>
+        </p:nvSpPr>
+        <p:spPr/>
+        <p:txBody>
+          <a:bodyPr/>
+          <a:lstStyle/>
+          <a:p>
+            <a:r>
+              <a:rPr lang="en-US" dirty="0" smtClean="0"/>
+              <a:t>Angular</a:t>
+            </a:r>
+            <a:r>
+              <a:rPr lang="en-US" dirty="0" smtClean="0"/>
+              <a:t> </a:t>
+            </a:r>
+            <a:r>
+              <a:rPr lang="en-US" dirty="0" smtClean="0"/>
+              <a:t>versus Unobtrusive JavaScript</a:t>
+            </a:r>
+            <a:endParaRPr lang="en-US" dirty="0"/>
+          </a:p>
+        </p:txBody>
+      </p:sp>
+      <p:sp>
+        <p:nvSpPr>
+          <p:cNvPr id="3" name="Text Placeholder 2"/>
+          <p:cNvSpPr>
+            <a:spLocks noGrp="1"/>
+          </p:cNvSpPr>
+          <p:nvPr>
+            <p:ph type="body" idx="1"/>
+          </p:nvPr>
+        </p:nvSpPr>
+        <p:spPr/>
+        <p:txBody>
+          <a:bodyPr/>
+          <a:lstStyle/>
+          <a:p>
+            <a:r>
+              <a:rPr lang="en-US" dirty="0" smtClean="0"/>
+              <a:t>Everyone is using JavaScript</a:t>
+            </a:r>
+          </a:p>
+          <a:p>
+            <a:r>
+              <a:rPr lang="en-US" dirty="0" smtClean="0"/>
+              <a:t>Angular behaves the same across browsers</a:t>
+            </a:r>
+          </a:p>
+          <a:p>
+            <a:r>
+              <a:rPr lang="en-US" dirty="0" smtClean="0"/>
+              <a:t>Expressions not evaluated in global scope</a:t>
+            </a:r>
+          </a:p>
+          <a:p>
+            <a:endParaRPr lang="en-US" dirty="0" smtClean="0"/>
+          </a:p>
+          <a:p>
+            <a:endParaRPr lang="en-US" dirty="0"/>
+          </a:p>
+        </p:txBody>
+      </p:sp>
+      <p:pic>
+        <p:nvPicPr>
+          <p:cNvPr id="5" name="Picture 4"/>
+          <p:cNvPicPr>
+            <a:picLocks noChangeAspect="1"/>
+          </p:cNvPicPr>
+          <p:nvPr/>
+        </p:nvPicPr>
+        <p:blipFill>
+          <a:blip r:embed="rId2"/>
+          <a:stretch>
+            <a:fillRect/>
+          </a:stretch>
+        </p:blipFill>
+        <p:spPr>
+          <a:xfrm>
+            <a:off x="1981200" y="3352800"/>
+            <a:ext cx="4229100" cy="1590675"/>
+          </a:xfrm>
+          <a:prstGeom prst="rect">
+            <a:avLst/>
+          </a:prstGeom>
+        </p:spPr>
+      </p:pic>
+    </p:spTree>
+    <p:extLst>
+      <p:ext uri="{BB962C8B-B14F-4D97-AF65-F5344CB8AC3E}">
+        <p14:creationId xmlns:p14="http://schemas.microsoft.com/office/powerpoint/2010/main" val="686790238"/>
+      </p:ext>
+    </p:extLst>
+  </p:cSld>
+  <p:clrMapOvr>
+    <a:masterClrMapping/>
+  </p:clrMapOvr>
+  <p:transition>
+    <p:fade/>
+  </p:transition>
+  <p:timing>
+    <p:tnLst>
+      <p:par>
+        <p:cTn id="1" dur="indefinite" restart="never" nodeType="tmRoot"/>
+      </p:par>
+    </p:tnLst>
+  </p:timing>
+</p:sld>
+</file>
+
+<file path=ppt/slides/slide18.xml><?xml version="1.0" encoding="utf-8"?>
+<p:sld xmlns:a="http://schemas.openxmlformats.org/drawingml/2006/main" xmlns:r="http://schemas.openxmlformats.org/officeDocument/2006/relationships" xmlns:p="http://schemas.openxmlformats.org/presentationml/2006/main">
+  <p:cSld>
+    <p:spTree>
+      <p:nvGrpSpPr>
+        <p:cNvPr id="1" name=""/>
+        <p:cNvGrpSpPr/>
+        <p:nvPr/>
+      </p:nvGrpSpPr>
+      <p:grpSpPr>
+        <a:xfrm>
+          <a:off x="0" y="0"/>
+          <a:ext cx="0" cy="0"/>
+          <a:chOff x="0" y="0"/>
+          <a:chExt cx="0" cy="0"/>
+        </a:xfrm>
+      </p:grpSpPr>
+      <p:sp>
+        <p:nvSpPr>
+          <p:cNvPr id="2" name="Title 1"/>
+          <p:cNvSpPr>
+            <a:spLocks noGrp="1"/>
+          </p:cNvSpPr>
+          <p:nvPr>
+            <p:ph type="title"/>
+          </p:nvPr>
+        </p:nvSpPr>
+        <p:spPr/>
+        <p:txBody>
+          <a:bodyPr/>
+          <a:lstStyle/>
+          <a:p>
+            <a:r>
+              <a:rPr lang="en-US" dirty="0" smtClean="0"/>
+              <a:t>Lists and Tables</a:t>
+            </a:r>
+            <a:endParaRPr lang="en-US" dirty="0"/>
+          </a:p>
+        </p:txBody>
+      </p:sp>
+      <p:sp>
+        <p:nvSpPr>
+          <p:cNvPr id="3" name="Text Placeholder 2"/>
+          <p:cNvSpPr>
+            <a:spLocks noGrp="1"/>
+          </p:cNvSpPr>
+          <p:nvPr>
+            <p:ph type="body" idx="1"/>
+          </p:nvPr>
+        </p:nvSpPr>
+        <p:spPr/>
+        <p:txBody>
+          <a:bodyPr/>
+          <a:lstStyle/>
+          <a:p>
+            <a:r>
+              <a:rPr lang="en-US" dirty="0" smtClean="0"/>
+              <a:t>Use </a:t>
+            </a:r>
+            <a:r>
+              <a:rPr lang="en-US" dirty="0" err="1" smtClean="0"/>
+              <a:t>ngFor</a:t>
+            </a:r>
+            <a:endParaRPr lang="en-US" dirty="0" smtClean="0"/>
+          </a:p>
+          <a:p>
+            <a:pPr lvl="1"/>
+            <a:r>
+              <a:rPr lang="en-US" dirty="0" smtClean="0"/>
+              <a:t>Semantics similar to the new for-of loop in ES2015</a:t>
+            </a:r>
+          </a:p>
+          <a:p>
+            <a:pPr lvl="1"/>
+            <a:r>
+              <a:rPr lang="en-US" dirty="0" smtClean="0"/>
+              <a:t>Works with any iterable</a:t>
+            </a:r>
+          </a:p>
+          <a:p>
+            <a:pPr lvl="1"/>
+            <a:r>
+              <a:rPr lang="en-US" dirty="0" smtClean="0"/>
+              <a:t>Updates the screen if collection changes</a:t>
+            </a:r>
+            <a:endParaRPr lang="en-US" dirty="0"/>
+          </a:p>
+        </p:txBody>
+      </p:sp>
+      <p:pic>
+        <p:nvPicPr>
+          <p:cNvPr id="4" name="Picture 3"/>
+          <p:cNvPicPr>
+            <a:picLocks noChangeAspect="1"/>
+          </p:cNvPicPr>
+          <p:nvPr/>
+        </p:nvPicPr>
+        <p:blipFill>
+          <a:blip r:embed="rId2"/>
+          <a:stretch>
+            <a:fillRect/>
+          </a:stretch>
+        </p:blipFill>
+        <p:spPr>
+          <a:xfrm>
+            <a:off x="1447800" y="3200400"/>
+            <a:ext cx="5260532" cy="2895600"/>
+          </a:xfrm>
+          <a:prstGeom prst="rect">
+            <a:avLst/>
+          </a:prstGeom>
+        </p:spPr>
+      </p:pic>
+    </p:spTree>
+    <p:extLst>
+      <p:ext uri="{BB962C8B-B14F-4D97-AF65-F5344CB8AC3E}">
+        <p14:creationId xmlns:p14="http://schemas.microsoft.com/office/powerpoint/2010/main" val="2968117420"/>
+      </p:ext>
+    </p:extLst>
+  </p:cSld>
+  <p:clrMapOvr>
+    <a:masterClrMapping/>
+  </p:clrMapOvr>
+  <p:transition>
+    <p:fade/>
+  </p:transition>
+  <p:timing>
+    <p:tnLst>
+      <p:par>
+        <p:cTn id="1" dur="indefinite" restart="never" nodeType="tmRoot"/>
+      </p:par>
+    </p:tnLst>
+  </p:timing>
+</p:sld>
+</file>
+
+<file path=ppt/slides/slide19.xml><?xml version="1.0" encoding="utf-8"?>
+<p:sld xmlns:a="http://schemas.openxmlformats.org/drawingml/2006/main" xmlns:r="http://schemas.openxmlformats.org/officeDocument/2006/relationships" xmlns:p="http://schemas.openxmlformats.org/presentationml/2006/main">
+  <p:cSld>
+    <p:spTree>
+      <p:nvGrpSpPr>
+        <p:cNvPr id="1" name=""/>
+        <p:cNvGrpSpPr/>
+        <p:nvPr/>
+      </p:nvGrpSpPr>
+      <p:grpSpPr>
+        <a:xfrm>
+          <a:off x="0" y="0"/>
+          <a:ext cx="0" cy="0"/>
+          <a:chOff x="0" y="0"/>
+          <a:chExt cx="0" cy="0"/>
+        </a:xfrm>
+      </p:grpSpPr>
+      <p:sp>
+        <p:nvSpPr>
+          <p:cNvPr id="2" name="Title 1"/>
+          <p:cNvSpPr>
+            <a:spLocks noGrp="1"/>
+          </p:cNvSpPr>
+          <p:nvPr>
+            <p:ph type="title"/>
+          </p:nvPr>
+        </p:nvSpPr>
+        <p:spPr/>
+        <p:txBody>
+          <a:bodyPr/>
+          <a:lstStyle/>
+          <a:p>
+            <a:r>
+              <a:rPr lang="en-US" dirty="0" smtClean="0"/>
+              <a:t>Hiding and Showing</a:t>
+            </a:r>
+            <a:endParaRPr lang="en-US" dirty="0"/>
+          </a:p>
+        </p:txBody>
+      </p:sp>
+      <p:sp>
+        <p:nvSpPr>
+          <p:cNvPr id="3" name="Text Placeholder 2"/>
+          <p:cNvSpPr>
+            <a:spLocks noGrp="1"/>
+          </p:cNvSpPr>
+          <p:nvPr>
+            <p:ph type="body" idx="1"/>
+          </p:nvPr>
+        </p:nvSpPr>
+        <p:spPr/>
+        <p:txBody>
+          <a:bodyPr/>
+          <a:lstStyle/>
+          <a:p>
+            <a:r>
+              <a:rPr lang="en-US" dirty="0" smtClean="0"/>
+              <a:t>Several approaches</a:t>
+            </a:r>
+          </a:p>
+          <a:p>
+            <a:pPr lvl="1"/>
+            <a:r>
+              <a:rPr lang="en-US" dirty="0" smtClean="0"/>
+              <a:t>Use *</a:t>
+            </a:r>
+            <a:r>
+              <a:rPr lang="en-US" dirty="0" err="1" smtClean="0"/>
+              <a:t>ngIf</a:t>
+            </a:r>
+            <a:endParaRPr lang="en-US" dirty="0" smtClean="0"/>
+          </a:p>
+          <a:p>
+            <a:pPr lvl="1"/>
+            <a:r>
+              <a:rPr lang="en-US" dirty="0" smtClean="0"/>
+              <a:t>Bind to the hidden property</a:t>
+            </a:r>
+          </a:p>
+          <a:p>
+            <a:pPr lvl="1"/>
+            <a:r>
+              <a:rPr lang="en-US" dirty="0" smtClean="0"/>
+              <a:t>Bind to the </a:t>
+            </a:r>
+            <a:r>
+              <a:rPr lang="en-US" dirty="0" err="1" smtClean="0"/>
+              <a:t>style.display</a:t>
+            </a:r>
+            <a:r>
+              <a:rPr lang="en-US" dirty="0" smtClean="0"/>
+              <a:t> property</a:t>
+            </a:r>
+            <a:endParaRPr lang="en-US" dirty="0"/>
+          </a:p>
+        </p:txBody>
+      </p:sp>
+      <p:pic>
+        <p:nvPicPr>
+          <p:cNvPr id="4" name="Picture 3"/>
+          <p:cNvPicPr>
+            <a:picLocks noChangeAspect="1"/>
+          </p:cNvPicPr>
+          <p:nvPr/>
+        </p:nvPicPr>
+        <p:blipFill>
+          <a:blip r:embed="rId2"/>
+          <a:stretch>
+            <a:fillRect/>
+          </a:stretch>
+        </p:blipFill>
+        <p:spPr>
+          <a:xfrm>
+            <a:off x="128095" y="3200400"/>
+            <a:ext cx="8887810" cy="1676400"/>
+          </a:xfrm>
+          <a:prstGeom prst="rect">
+            <a:avLst/>
+          </a:prstGeom>
+        </p:spPr>
+      </p:pic>
+    </p:spTree>
+    <p:extLst>
+      <p:ext uri="{BB962C8B-B14F-4D97-AF65-F5344CB8AC3E}">
+        <p14:creationId xmlns:p14="http://schemas.microsoft.com/office/powerpoint/2010/main" val="3310555310"/>
+      </p:ext>
+    </p:extLst>
+  </p:cSld>
+  <p:clrMapOvr>
+    <a:masterClrMapping/>
+  </p:clrMapOvr>
+  <p:transition>
+    <p:fade/>
+  </p:transition>
+  <p:timing>
+    <p:tnLst>
+      <p:par>
+        <p:cTn id="1" dur="indefinite" restart="never" nodeType="tmRoot"/>
+      </p:par>
+    </p:tnLst>
+  </p:timing>
+</p:sld>
+</file>
+
 <file path=ppt/slides/slide2.xml><?xml version="1.0" encoding="utf-8"?>
 <p:sld xmlns:a="http://schemas.openxmlformats.org/drawingml/2006/main" xmlns:r="http://schemas.openxmlformats.org/officeDocument/2006/relationships" xmlns:p="http://schemas.openxmlformats.org/presentationml/2006/main">
   <p:cSld>
@@ -2644,6 +4935,405 @@
 </p:sld>
 </file>
 
+<file path=ppt/slides/slide20.xml><?xml version="1.0" encoding="utf-8"?>
+<p:sld xmlns:a="http://schemas.openxmlformats.org/drawingml/2006/main" xmlns:r="http://schemas.openxmlformats.org/officeDocument/2006/relationships" xmlns:p="http://schemas.openxmlformats.org/presentationml/2006/main">
+  <p:cSld>
+    <p:spTree>
+      <p:nvGrpSpPr>
+        <p:cNvPr id="1" name=""/>
+        <p:cNvGrpSpPr/>
+        <p:nvPr/>
+      </p:nvGrpSpPr>
+      <p:grpSpPr>
+        <a:xfrm>
+          <a:off x="0" y="0"/>
+          <a:ext cx="0" cy="0"/>
+          <a:chOff x="0" y="0"/>
+          <a:chExt cx="0" cy="0"/>
+        </a:xfrm>
+      </p:grpSpPr>
+      <p:sp>
+        <p:nvSpPr>
+          <p:cNvPr id="2" name="Title 1"/>
+          <p:cNvSpPr>
+            <a:spLocks noGrp="1"/>
+          </p:cNvSpPr>
+          <p:nvPr>
+            <p:ph type="title"/>
+          </p:nvPr>
+        </p:nvSpPr>
+        <p:spPr/>
+        <p:txBody>
+          <a:bodyPr/>
+          <a:lstStyle/>
+          <a:p>
+            <a:r>
+              <a:rPr lang="en-US" dirty="0" smtClean="0"/>
+              <a:t>Styles</a:t>
+            </a:r>
+            <a:endParaRPr lang="en-US" dirty="0"/>
+          </a:p>
+        </p:txBody>
+      </p:sp>
+      <p:sp>
+        <p:nvSpPr>
+          <p:cNvPr id="3" name="Text Placeholder 2"/>
+          <p:cNvSpPr>
+            <a:spLocks noGrp="1"/>
+          </p:cNvSpPr>
+          <p:nvPr>
+            <p:ph type="body" idx="1"/>
+          </p:nvPr>
+        </p:nvSpPr>
+        <p:spPr/>
+        <p:txBody>
+          <a:bodyPr/>
+          <a:lstStyle/>
+          <a:p>
+            <a:r>
+              <a:rPr lang="en-US" dirty="0" smtClean="0"/>
+              <a:t>Use the </a:t>
+            </a:r>
+            <a:r>
+              <a:rPr lang="en-US" dirty="0" err="1" smtClean="0"/>
+              <a:t>ngClass</a:t>
+            </a:r>
+            <a:r>
+              <a:rPr lang="en-US" dirty="0" smtClean="0"/>
+              <a:t> directive </a:t>
+            </a:r>
+          </a:p>
+          <a:p>
+            <a:pPr lvl="1"/>
+            <a:r>
+              <a:rPr lang="en-US" dirty="0" smtClean="0"/>
+              <a:t>Adds class names for </a:t>
+            </a:r>
+            <a:r>
+              <a:rPr lang="en-US" dirty="0" err="1" smtClean="0"/>
+              <a:t>truthy</a:t>
+            </a:r>
+            <a:r>
+              <a:rPr lang="en-US" dirty="0" smtClean="0"/>
+              <a:t> values</a:t>
+            </a:r>
+            <a:endParaRPr lang="en-US" dirty="0"/>
+          </a:p>
+        </p:txBody>
+      </p:sp>
+      <p:pic>
+        <p:nvPicPr>
+          <p:cNvPr id="4" name="Picture 3"/>
+          <p:cNvPicPr>
+            <a:picLocks noChangeAspect="1"/>
+          </p:cNvPicPr>
+          <p:nvPr/>
+        </p:nvPicPr>
+        <p:blipFill>
+          <a:blip r:embed="rId2"/>
+          <a:stretch>
+            <a:fillRect/>
+          </a:stretch>
+        </p:blipFill>
+        <p:spPr>
+          <a:xfrm>
+            <a:off x="457200" y="2895600"/>
+            <a:ext cx="7938213" cy="923925"/>
+          </a:xfrm>
+          <a:prstGeom prst="rect">
+            <a:avLst/>
+          </a:prstGeom>
+        </p:spPr>
+      </p:pic>
+    </p:spTree>
+    <p:extLst>
+      <p:ext uri="{BB962C8B-B14F-4D97-AF65-F5344CB8AC3E}">
+        <p14:creationId xmlns:p14="http://schemas.microsoft.com/office/powerpoint/2010/main" val="1399393236"/>
+      </p:ext>
+    </p:extLst>
+  </p:cSld>
+  <p:clrMapOvr>
+    <a:masterClrMapping/>
+  </p:clrMapOvr>
+  <p:transition>
+    <p:fade/>
+  </p:transition>
+  <p:timing>
+    <p:tnLst>
+      <p:par>
+        <p:cTn id="1" dur="indefinite" restart="never" nodeType="tmRoot"/>
+      </p:par>
+    </p:tnLst>
+  </p:timing>
+</p:sld>
+</file>
+
+<file path=ppt/slides/slide21.xml><?xml version="1.0" encoding="utf-8"?>
+<p:sld xmlns:a="http://schemas.openxmlformats.org/drawingml/2006/main" xmlns:r="http://schemas.openxmlformats.org/officeDocument/2006/relationships" xmlns:p="http://schemas.openxmlformats.org/presentationml/2006/main">
+  <p:cSld>
+    <p:spTree>
+      <p:nvGrpSpPr>
+        <p:cNvPr id="1" name=""/>
+        <p:cNvGrpSpPr/>
+        <p:nvPr/>
+      </p:nvGrpSpPr>
+      <p:grpSpPr>
+        <a:xfrm>
+          <a:off x="0" y="0"/>
+          <a:ext cx="0" cy="0"/>
+          <a:chOff x="0" y="0"/>
+          <a:chExt cx="0" cy="0"/>
+        </a:xfrm>
+      </p:grpSpPr>
+      <p:sp>
+        <p:nvSpPr>
+          <p:cNvPr id="2" name="Title 1"/>
+          <p:cNvSpPr>
+            <a:spLocks noGrp="1"/>
+          </p:cNvSpPr>
+          <p:nvPr>
+            <p:ph type="title"/>
+          </p:nvPr>
+        </p:nvSpPr>
+        <p:spPr/>
+        <p:txBody>
+          <a:bodyPr/>
+          <a:lstStyle/>
+          <a:p>
+            <a:r>
+              <a:rPr lang="en-US" dirty="0" smtClean="0"/>
+              <a:t>Debugging</a:t>
+            </a:r>
+            <a:endParaRPr lang="en-US" dirty="0"/>
+          </a:p>
+        </p:txBody>
+      </p:sp>
+      <p:sp>
+        <p:nvSpPr>
+          <p:cNvPr id="3" name="Text Placeholder 2"/>
+          <p:cNvSpPr>
+            <a:spLocks noGrp="1"/>
+          </p:cNvSpPr>
+          <p:nvPr>
+            <p:ph type="body" idx="1"/>
+          </p:nvPr>
+        </p:nvSpPr>
+        <p:spPr/>
+        <p:txBody>
+          <a:bodyPr/>
+          <a:lstStyle/>
+          <a:p>
+            <a:r>
+              <a:rPr lang="en-US" dirty="0" smtClean="0"/>
+              <a:t>Source maps let you step through </a:t>
+            </a:r>
+            <a:r>
+              <a:rPr lang="en-US" dirty="0" err="1" smtClean="0"/>
+              <a:t>TypeScript</a:t>
+            </a:r>
+            <a:endParaRPr lang="en-US" dirty="0"/>
+          </a:p>
+        </p:txBody>
+      </p:sp>
+      <p:pic>
+        <p:nvPicPr>
+          <p:cNvPr id="4" name="Picture 3"/>
+          <p:cNvPicPr>
+            <a:picLocks noChangeAspect="1"/>
+          </p:cNvPicPr>
+          <p:nvPr/>
+        </p:nvPicPr>
+        <p:blipFill>
+          <a:blip r:embed="rId2"/>
+          <a:stretch>
+            <a:fillRect/>
+          </a:stretch>
+        </p:blipFill>
+        <p:spPr>
+          <a:xfrm>
+            <a:off x="1447800" y="2895600"/>
+            <a:ext cx="5553075" cy="2038350"/>
+          </a:xfrm>
+          <a:prstGeom prst="rect">
+            <a:avLst/>
+          </a:prstGeom>
+        </p:spPr>
+      </p:pic>
+    </p:spTree>
+    <p:extLst>
+      <p:ext uri="{BB962C8B-B14F-4D97-AF65-F5344CB8AC3E}">
+        <p14:creationId xmlns:p14="http://schemas.microsoft.com/office/powerpoint/2010/main" val="1156462374"/>
+      </p:ext>
+    </p:extLst>
+  </p:cSld>
+  <p:clrMapOvr>
+    <a:masterClrMapping/>
+  </p:clrMapOvr>
+  <p:transition>
+    <p:fade/>
+  </p:transition>
+  <p:timing>
+    <p:tnLst>
+      <p:par>
+        <p:cTn id="1" dur="indefinite" restart="never" nodeType="tmRoot"/>
+      </p:par>
+    </p:tnLst>
+  </p:timing>
+</p:sld>
+</file>
+
+<file path=ppt/slides/slide22.xml><?xml version="1.0" encoding="utf-8"?>
+<p:sld xmlns:a="http://schemas.openxmlformats.org/drawingml/2006/main" xmlns:r="http://schemas.openxmlformats.org/officeDocument/2006/relationships" xmlns:p="http://schemas.openxmlformats.org/presentationml/2006/main">
+  <p:cSld>
+    <p:spTree>
+      <p:nvGrpSpPr>
+        <p:cNvPr id="1" name=""/>
+        <p:cNvGrpSpPr/>
+        <p:nvPr/>
+      </p:nvGrpSpPr>
+      <p:grpSpPr>
+        <a:xfrm>
+          <a:off x="0" y="0"/>
+          <a:ext cx="0" cy="0"/>
+          <a:chOff x="0" y="0"/>
+          <a:chExt cx="0" cy="0"/>
+        </a:xfrm>
+      </p:grpSpPr>
+      <p:sp>
+        <p:nvSpPr>
+          <p:cNvPr id="2" name="Title 1"/>
+          <p:cNvSpPr>
+            <a:spLocks noGrp="1"/>
+          </p:cNvSpPr>
+          <p:nvPr>
+            <p:ph type="title"/>
+          </p:nvPr>
+        </p:nvSpPr>
+        <p:spPr/>
+        <p:txBody>
+          <a:bodyPr/>
+          <a:lstStyle/>
+          <a:p>
+            <a:r>
+              <a:rPr lang="en-US" dirty="0" smtClean="0"/>
+              <a:t>Summary</a:t>
+            </a:r>
+            <a:endParaRPr lang="en-US" dirty="0"/>
+          </a:p>
+        </p:txBody>
+      </p:sp>
+      <p:sp>
+        <p:nvSpPr>
+          <p:cNvPr id="3" name="Text Placeholder 2"/>
+          <p:cNvSpPr>
+            <a:spLocks noGrp="1"/>
+          </p:cNvSpPr>
+          <p:nvPr>
+            <p:ph type="body" idx="1"/>
+          </p:nvPr>
+        </p:nvSpPr>
+        <p:spPr/>
+        <p:txBody>
+          <a:bodyPr/>
+          <a:lstStyle/>
+          <a:p>
+            <a:r>
+              <a:rPr lang="en-US" dirty="0" smtClean="0"/>
+              <a:t>Angular2 </a:t>
+            </a:r>
+            <a:r>
+              <a:rPr lang="en-US" dirty="0" smtClean="0"/>
+              <a:t>is an application framework</a:t>
+            </a:r>
+          </a:p>
+          <a:p>
+            <a:pPr lvl="1"/>
+            <a:r>
+              <a:rPr lang="en-US" dirty="0" smtClean="0"/>
+              <a:t>Similar to an MVVM design</a:t>
+            </a:r>
+          </a:p>
+          <a:p>
+            <a:r>
+              <a:rPr lang="en-US" dirty="0" smtClean="0"/>
+              <a:t>Extensible</a:t>
+            </a:r>
+            <a:r>
+              <a:rPr lang="en-US" dirty="0" smtClean="0"/>
+              <a:t>, modular, </a:t>
+            </a:r>
+            <a:r>
+              <a:rPr lang="en-US" dirty="0" smtClean="0"/>
+              <a:t>testable</a:t>
+            </a:r>
+            <a:endParaRPr lang="en-US" dirty="0" smtClean="0"/>
+          </a:p>
+        </p:txBody>
+      </p:sp>
+      <p:pic>
+        <p:nvPicPr>
+          <p:cNvPr id="4" name="Picture 2" descr="http://angularjs.org/img/AngularJS-large.png"/>
+          <p:cNvPicPr>
+            <a:picLocks noChangeAspect="1" noChangeArrowheads="1"/>
+          </p:cNvPicPr>
+          <p:nvPr/>
+        </p:nvPicPr>
+        <p:blipFill>
+          <a:blip r:embed="rId2">
+            <a:extLst>
+              <a:ext uri="{28A0092B-C50C-407E-A947-70E740481C1C}">
+                <a14:useLocalDpi xmlns:a14="http://schemas.microsoft.com/office/drawing/2010/main" val="0"/>
+              </a:ext>
+            </a:extLst>
+          </a:blip>
+          <a:srcRect/>
+          <a:stretch>
+            <a:fillRect/>
+          </a:stretch>
+        </p:blipFill>
+        <p:spPr bwMode="auto">
+          <a:xfrm>
+            <a:off x="2438400" y="3181349"/>
+            <a:ext cx="3648075" cy="1028701"/>
+          </a:xfrm>
+          <a:prstGeom prst="rect">
+            <a:avLst/>
+          </a:prstGeom>
+          <a:noFill/>
+          <a:extLst>
+            <a:ext uri="{909E8E84-426E-40DD-AFC4-6F175D3DCCD1}">
+              <a14:hiddenFill xmlns:a14="http://schemas.microsoft.com/office/drawing/2010/main">
+                <a:solidFill>
+                  <a:srgbClr val="FFFFFF"/>
+                </a:solidFill>
+              </a14:hiddenFill>
+            </a:ext>
+          </a:extLst>
+        </p:spPr>
+      </p:pic>
+    </p:spTree>
+    <p:extLst>
+      <p:ext uri="{BB962C8B-B14F-4D97-AF65-F5344CB8AC3E}">
+        <p14:creationId xmlns:p14="http://schemas.microsoft.com/office/powerpoint/2010/main" val="1164403621"/>
+      </p:ext>
+    </p:extLst>
+  </p:cSld>
+  <p:clrMapOvr>
+    <a:masterClrMapping/>
+  </p:clrMapOvr>
+  <p:transition>
+    <p:fade/>
+  </p:transition>
+  <p:timing>
+    <p:tnLst>
+      <p:par>
+        <p:cTn id="1" dur="indefinite" restart="never" nodeType="tmRoot"/>
+      </p:par>
+    </p:tnLst>
+  </p:timing>
+</p:sld>
+</file>
+
 <file path=ppt/slides/slide3.xml><?xml version="1.0" encoding="utf-8"?>
 <p:sld xmlns:a="http://schemas.openxmlformats.org/drawingml/2006/main" xmlns:r="http://schemas.openxmlformats.org/officeDocument/2006/relationships" xmlns:p="http://schemas.openxmlformats.org/presentationml/2006/main">
   <p:cSld>
@@ -2745,12 +5435,6 @@
               </a:rPr>
               <a:t>of</a:t>
             </a:r>
-            <a:endParaRPr lang="en-US" sz="2000" dirty="0" smtClean="0">
-              <a:solidFill>
-                <a:schemeClr val="tx1"/>
-              </a:solidFill>
-              <a:latin typeface="Tekton Pro" pitchFamily="34" charset="0"/>
-            </a:endParaRPr>
           </a:p>
           <a:p>
             <a:pPr algn="ctr"/>
@@ -3665,13 +6349,43 @@
               <a:rPr lang="en-US" sz="2000" dirty="0" err="1" smtClean="0">
                 <a:latin typeface="Consolas" panose="020B0609020204030204" pitchFamily="49" charset="0"/>
               </a:rPr>
-              <a:t>systemjs</a:t>
+              <a:t>rxjs</a:t>
+            </a:r>
+            <a:endParaRPr lang="en-US" sz="2000" dirty="0" smtClean="0">
+              <a:latin typeface="Consolas" panose="020B0609020204030204" pitchFamily="49" charset="0"/>
+            </a:endParaRPr>
+          </a:p>
+          <a:p>
+            <a:pPr algn="l"/>
+            <a:r>
+              <a:rPr lang="en-US" sz="2000" dirty="0">
+                <a:latin typeface="Consolas" panose="020B0609020204030204" pitchFamily="49" charset="0"/>
+              </a:rPr>
+              <a:t> </a:t>
             </a:r>
             <a:r>
               <a:rPr lang="en-US" sz="2000" dirty="0" smtClean="0">
                 <a:latin typeface="Consolas" panose="020B0609020204030204" pitchFamily="49" charset="0"/>
               </a:rPr>
-              <a:t> --save</a:t>
+              <a:t>           </a:t>
+            </a:r>
+            <a:r>
+              <a:rPr lang="en-US" sz="2000" dirty="0" err="1" smtClean="0">
+                <a:latin typeface="Consolas" panose="020B0609020204030204" pitchFamily="49" charset="0"/>
+              </a:rPr>
+              <a:t>systemjs</a:t>
+            </a:r>
+            <a:r>
+              <a:rPr lang="en-US" sz="2000" dirty="0" smtClean="0">
+                <a:latin typeface="Consolas" panose="020B0609020204030204" pitchFamily="49" charset="0"/>
+              </a:rPr>
+              <a:t> reflect-metadata --</a:t>
+            </a:r>
+            <a:r>
+              <a:rPr lang="en-US" sz="2000" dirty="0" smtClean="0">
+                <a:latin typeface="Consolas" panose="020B0609020204030204" pitchFamily="49" charset="0"/>
+              </a:rPr>
+              <a:t>save</a:t>
             </a:r>
           </a:p>
           <a:p>
@@ -4029,7 +6743,7 @@
       </p:sp>
       <p:pic>
         <p:nvPicPr>
-          <p:cNvPr id="5" name="Picture 4"/>
+          <p:cNvPr id="4" name="Picture 3"/>
           <p:cNvPicPr>
             <a:picLocks noChangeAspect="1"/>
           </p:cNvPicPr>
@@ -4043,8 +6757,8 @@
         </p:blipFill>
         <p:spPr>
           <a:xfrm>
-            <a:off x="381000" y="1066800"/>
-            <a:ext cx="8476939" cy="5553075"/>
+            <a:off x="838200" y="951786"/>
+            <a:ext cx="7239000" cy="5487828"/>
           </a:xfrm>
           <a:prstGeom prst="rect">
             <a:avLst/>
@@ -4135,7 +6849,7 @@
       </p:sp>
       <p:pic>
         <p:nvPicPr>
-          <p:cNvPr id="4" name="Picture 3"/>
+          <p:cNvPr id="5" name="Picture 4"/>
           <p:cNvPicPr>
             <a:picLocks noChangeAspect="1"/>
           </p:cNvPicPr>
@@ -4149,8 +6863,8 @@
         </p:blipFill>
         <p:spPr>
           <a:xfrm>
-            <a:off x="176212" y="1400175"/>
-            <a:ext cx="8791575" cy="4057650"/>
+            <a:off x="1295400" y="1478280"/>
+            <a:ext cx="6296025" cy="4206955"/>
           </a:xfrm>
           <a:prstGeom prst="rect">
             <a:avLst/>
@@ -4815,7 +7529,11 @@
           <a:bodyPr/>
           <a:lstStyle/>
           <a:p>
-            <a:endParaRPr lang="en-US"/>
+            <a:r>
+              <a:rPr lang="en-US" dirty="0" smtClean="0"/>
+              <a:t>Directives</a:t>
+            </a:r>
+            <a:endParaRPr lang="en-US" dirty="0"/>
           </a:p>
         </p:txBody>
       </p:sp>
@@ -4834,10 +7552,68 @@
           <a:bodyPr/>
           <a:lstStyle/>
           <a:p>
-            <a:endParaRPr lang="en-US"/>
+            <a:r>
+              <a:rPr lang="en-US" dirty="0" smtClean="0"/>
+              <a:t>Directives extend HTML</a:t>
+            </a:r>
+          </a:p>
+          <a:p>
+            <a:pPr lvl="1"/>
+            <a:r>
+              <a:rPr lang="en-US" dirty="0" smtClean="0"/>
+              <a:t>Add behavior or change the appearance of the DOM</a:t>
+            </a:r>
+          </a:p>
+          <a:p>
+            <a:pPr lvl="1"/>
+            <a:r>
+              <a:rPr lang="en-US" dirty="0" smtClean="0"/>
+              <a:t>Angular compiles markup to process directives</a:t>
+            </a:r>
+          </a:p>
+          <a:p>
+            <a:r>
+              <a:rPr lang="en-US" dirty="0" smtClean="0"/>
+              <a:t>You can build your own directives</a:t>
+            </a:r>
+          </a:p>
+          <a:p>
+            <a:pPr lvl="1"/>
+            <a:r>
+              <a:rPr lang="en-US" dirty="0" smtClean="0"/>
+              <a:t>In fact, this is encouraged</a:t>
+            </a:r>
+          </a:p>
+          <a:p>
+            <a:pPr lvl="1"/>
+            <a:endParaRPr lang="en-US" dirty="0"/>
           </a:p>
         </p:txBody>
       </p:sp>
+      <p:pic>
+        <p:nvPicPr>
+          <p:cNvPr id="4" name="Picture 3"/>
+          <p:cNvPicPr>
+            <a:picLocks noChangeAspect="1"/>
+          </p:cNvPicPr>
+          <p:nvPr/>
+        </p:nvPicPr>
+        <p:blipFill>
+          <a:blip r:embed="rId2"/>
+          <a:stretch>
+            <a:fillRect/>
+          </a:stretch>
+        </p:blipFill>
+        <p:spPr>
+          <a:xfrm>
+            <a:off x="1295400" y="3657600"/>
+            <a:ext cx="6029854" cy="2019300"/>
+          </a:xfrm>
+          <a:prstGeom prst="rect">
+            <a:avLst/>
+          </a:prstGeom>
+        </p:spPr>
+      </p:pic>
     </p:spTree>
     <p:extLst>
       <p:ext uri="{BB962C8B-B14F-4D97-AF65-F5344CB8AC3E}">
@@ -4854,7 +7630,335 @@
   <p:timing>
     <p:tnLst>
       <p:par>
-        <p:cTn id="1" dur="indefinite" restart="never" nodeType="tmRoot"/>
+        <p:cTn id="1" dur="indefinite" restart="never" nodeType="tmRoot">
+          <p:childTnLst>
+            <p:seq concurrent="1" nextAc="seek">
+              <p:cTn id="2" dur="indefinite" nodeType="mainSeq">
+                <p:childTnLst>
+                  <p:par>
+                    <p:cTn id="3" fill="hold">
+                      <p:stCondLst>
+                        <p:cond delay="indefinite"/>
+                      </p:stCondLst>
+                      <p:childTnLst>
+                        <p:par>
+                          <p:cTn id="4" fill="hold">
+                            <p:stCondLst>
+                              <p:cond delay="0"/>
+                            </p:stCondLst>
+                            <p:childTnLst>
+                              <p:par>
+                                <p:cTn id="5" presetID="10" presetClass="entr" presetSubtype="0" fill="hold" nodeType="clickEffect">
+                                  <p:stCondLst>
+                                    <p:cond delay="0"/>
+                                  </p:stCondLst>
+                                  <p:childTnLst>
+                                    <p:set>
+                                      <p:cBhvr>
+                                        <p:cTn id="6" dur="1" fill="hold">
+                                          <p:stCondLst>
+                                            <p:cond delay="0"/>
+                                          </p:stCondLst>
+                                        </p:cTn>
+                                        <p:tgtEl>
+                                          <p:spTgt spid="3">
+                                            <p:txEl>
+                                              <p:pRg st="0" end="0"/>
+                                            </p:txEl>
+                                          </p:spTgt>
+                                        </p:tgtEl>
+                                        <p:attrNameLst>
+                                          <p:attrName>style.visibility</p:attrName>
+                                        </p:attrNameLst>
+                                      </p:cBhvr>
+                                      <p:to>
+                                        <p:strVal val="visible"/>
+                                      </p:to>
+                                    </p:set>
+                                    <p:animEffect transition="in" filter="fade">
+                                      <p:cBhvr>
+                                        <p:cTn id="7" dur="500"/>
+                                        <p:tgtEl>
+                                          <p:spTgt spid="3">
+                                            <p:txEl>
+                                              <p:pRg st="0" end="0"/>
+                                            </p:txEl>
+                                          </p:spTgt>
+                                        </p:tgtEl>
+                                      </p:cBhvr>
+                                    </p:animEffect>
+                                  </p:childTnLst>
+                                </p:cTn>
+                              </p:par>
+                            </p:childTnLst>
+                          </p:cTn>
+                        </p:par>
+                      </p:childTnLst>
+                    </p:cTn>
+                  </p:par>
+                  <p:par>
+                    <p:cTn id="8" fill="hold">
+                      <p:stCondLst>
+                        <p:cond delay="indefinite"/>
+                      </p:stCondLst>
+                      <p:childTnLst>
+                        <p:par>
+                          <p:cTn id="9" fill="hold">
+                            <p:stCondLst>
+                              <p:cond delay="0"/>
+                            </p:stCondLst>
+                            <p:childTnLst>
+                              <p:par>
+                                <p:cTn id="10" presetID="10" presetClass="entr" presetSubtype="0" fill="hold" nodeType="clickEffect">
+                                  <p:stCondLst>
+                                    <p:cond delay="0"/>
+                                  </p:stCondLst>
+                                  <p:childTnLst>
+                                    <p:set>
+                                      <p:cBhvr>
+                                        <p:cTn id="11" dur="1" fill="hold">
+                                          <p:stCondLst>
+                                            <p:cond delay="0"/>
+                                          </p:stCondLst>
+                                        </p:cTn>
+                                        <p:tgtEl>
+                                          <p:spTgt spid="3">
+                                            <p:txEl>
+                                              <p:pRg st="1" end="1"/>
+                                            </p:txEl>
+                                          </p:spTgt>
+                                        </p:tgtEl>
+                                        <p:attrNameLst>
+                                          <p:attrName>style.visibility</p:attrName>
+                                        </p:attrNameLst>
+                                      </p:cBhvr>
+                                      <p:to>
+                                        <p:strVal val="visible"/>
+                                      </p:to>
+                                    </p:set>
+                                    <p:animEffect transition="in" filter="fade">
+                                      <p:cBhvr>
+                                        <p:cTn id="12" dur="500"/>
+                                        <p:tgtEl>
+                                          <p:spTgt spid="3">
+                                            <p:txEl>
+                                              <p:pRg st="1" end="1"/>
+                                            </p:txEl>
+                                          </p:spTgt>
+                                        </p:tgtEl>
+                                      </p:cBhvr>
+                                    </p:animEffect>
+                                  </p:childTnLst>
+                                </p:cTn>
+                              </p:par>
+                            </p:childTnLst>
+                          </p:cTn>
+                        </p:par>
+                      </p:childTnLst>
+                    </p:cTn>
+                  </p:par>
+                  <p:par>
+                    <p:cTn id="13" fill="hold">
+                      <p:stCondLst>
+                        <p:cond delay="indefinite"/>
+                      </p:stCondLst>
+                      <p:childTnLst>
+                        <p:par>
+                          <p:cTn id="14" fill="hold">
+                            <p:stCondLst>
+                              <p:cond delay="0"/>
+                            </p:stCondLst>
+                            <p:childTnLst>
+                              <p:par>
+                                <p:cTn id="15" presetID="10" presetClass="entr" presetSubtype="0" fill="hold" nodeType="clickEffect">
+                                  <p:stCondLst>
+                                    <p:cond delay="0"/>
+                                  </p:stCondLst>
+                                  <p:childTnLst>
+                                    <p:set>
+                                      <p:cBhvr>
+                                        <p:cTn id="16" dur="1" fill="hold">
+                                          <p:stCondLst>
+                                            <p:cond delay="0"/>
+                                          </p:stCondLst>
+                                        </p:cTn>
+                                        <p:tgtEl>
+                                          <p:spTgt spid="3">
+                                            <p:txEl>
+                                              <p:pRg st="2" end="2"/>
+                                            </p:txEl>
+                                          </p:spTgt>
+                                        </p:tgtEl>
+                                        <p:attrNameLst>
+                                          <p:attrName>style.visibility</p:attrName>
+                                        </p:attrNameLst>
+                                      </p:cBhvr>
+                                      <p:to>
+                                        <p:strVal val="visible"/>
+                                      </p:to>
+                                    </p:set>
+                                    <p:animEffect transition="in" filter="fade">
+                                      <p:cBhvr>
+                                        <p:cTn id="17" dur="500"/>
+                                        <p:tgtEl>
+                                          <p:spTgt spid="3">
+                                            <p:txEl>
+                                              <p:pRg st="2" end="2"/>
+                                            </p:txEl>
+                                          </p:spTgt>
+                                        </p:tgtEl>
+                                      </p:cBhvr>
+                                    </p:animEffect>
+                                  </p:childTnLst>
+                                </p:cTn>
+                              </p:par>
+                            </p:childTnLst>
+                          </p:cTn>
+                        </p:par>
+                      </p:childTnLst>
+                    </p:cTn>
+                  </p:par>
+                  <p:par>
+                    <p:cTn id="18" fill="hold">
+                      <p:stCondLst>
+                        <p:cond delay="indefinite"/>
+                      </p:stCondLst>
+                      <p:childTnLst>
+                        <p:par>
+                          <p:cTn id="19" fill="hold">
+                            <p:stCondLst>
+                              <p:cond delay="0"/>
+                            </p:stCondLst>
+                            <p:childTnLst>
+                              <p:par>
+                                <p:cTn id="20" presetID="10" presetClass="entr" presetSubtype="0" fill="hold" nodeType="clickEffect">
+                                  <p:stCondLst>
+                                    <p:cond delay="0"/>
+                                  </p:stCondLst>
+                                  <p:childTnLst>
+                                    <p:set>
+                                      <p:cBhvr>
+                                        <p:cTn id="21" dur="1" fill="hold">
+                                          <p:stCondLst>
+                                            <p:cond delay="0"/>
+                                          </p:stCondLst>
+                                        </p:cTn>
+                                        <p:tgtEl>
+                                          <p:spTgt spid="3">
+                                            <p:txEl>
+                                              <p:pRg st="3" end="3"/>
+                                            </p:txEl>
+                                          </p:spTgt>
+                                        </p:tgtEl>
+                                        <p:attrNameLst>
+                                          <p:attrName>style.visibility</p:attrName>
+                                        </p:attrNameLst>
+                                      </p:cBhvr>
+                                      <p:to>
+                                        <p:strVal val="visible"/>
+                                      </p:to>
+                                    </p:set>
+                                    <p:animEffect transition="in" filter="fade">
+                                      <p:cBhvr>
+                                        <p:cTn id="22" dur="500"/>
+                                        <p:tgtEl>
+                                          <p:spTgt spid="3">
+                                            <p:txEl>
+                                              <p:pRg st="3" end="3"/>
+                                            </p:txEl>
+                                          </p:spTgt>
+                                        </p:tgtEl>
+                                      </p:cBhvr>
+                                    </p:animEffect>
+                                  </p:childTnLst>
+                                </p:cTn>
+                              </p:par>
+                            </p:childTnLst>
+                          </p:cTn>
+                        </p:par>
+                      </p:childTnLst>
+                    </p:cTn>
+                  </p:par>
+                  <p:par>
+                    <p:cTn id="23" fill="hold">
+                      <p:stCondLst>
+                        <p:cond delay="indefinite"/>
+                      </p:stCondLst>
+                      <p:childTnLst>
+                        <p:par>
+                          <p:cTn id="24" fill="hold">
+                            <p:stCondLst>
+                              <p:cond delay="0"/>
+                            </p:stCondLst>
+                            <p:childTnLst>
+                              <p:par>
+                                <p:cTn id="25" presetID="10" presetClass="entr" presetSubtype="0" fill="hold" nodeType="clickEffect">
+                                  <p:stCondLst>
+                                    <p:cond delay="0"/>
+                                  </p:stCondLst>
+                                  <p:childTnLst>
+                                    <p:set>
+                                      <p:cBhvr>
+                                        <p:cTn id="26" dur="1" fill="hold">
+                                          <p:stCondLst>
+                                            <p:cond delay="0"/>
+                                          </p:stCondLst>
+                                        </p:cTn>
+                                        <p:tgtEl>
+                                          <p:spTgt spid="3">
+                                            <p:txEl>
+                                              <p:pRg st="4" end="4"/>
+                                            </p:txEl>
+                                          </p:spTgt>
+                                        </p:tgtEl>
+                                        <p:attrNameLst>
+                                          <p:attrName>style.visibility</p:attrName>
+                                        </p:attrNameLst>
+                                      </p:cBhvr>
+                                      <p:to>
+                                        <p:strVal val="visible"/>
+                                      </p:to>
+                                    </p:set>
+                                    <p:animEffect transition="in" filter="fade">
+                                      <p:cBhvr>
+                                        <p:cTn id="27" dur="500"/>
+                                        <p:tgtEl>
+                                          <p:spTgt spid="3">
+                                            <p:txEl>
+                                              <p:pRg st="4" end="4"/>
+                                            </p:txEl>
+                                          </p:spTgt>
+                                        </p:tgtEl>
+                                      </p:cBhvr>
+                                    </p:animEffect>
+                                  </p:childTnLst>
+                                </p:cTn>
+                              </p:par>
+                            </p:childTnLst>
+                          </p:cTn>
+                        </p:par>
+                      </p:childTnLst>
+                    </p:cTn>
+                  </p:par>
+                </p:childTnLst>
+              </p:cTn>
+              <p:prevCondLst>
+                <p:cond evt="onPrev" delay="0">
+                  <p:tgtEl>
+                    <p:sldTgt/>
+                  </p:tgtEl>
+                </p:cond>
+              </p:prevCondLst>
+              <p:nextCondLst>
+                <p:cond evt="onNext" delay="0">
+                  <p:tgtEl>
+                    <p:sldTgt/>
+                  </p:tgtEl>
+                </p:cond>
+              </p:nextCondLst>
+            </p:seq>
+          </p:childTnLst>
+        </p:cTn>
       </p:par>
     </p:tnLst>
   </p:timing>

</xml_diff>